<commit_message>
Add MVP and pitch docs. Presentation updates. Data Viz images.
</commit_message>
<xml_diff>
--- a/ford_adopt_EV.pptx
+++ b/ford_adopt_EV.pptx
@@ -5,23 +5,24 @@
     <p:sldMasterId id="2147483648" r:id="rId4"/>
   </p:sldMasterIdLst>
   <p:notesMasterIdLst>
-    <p:notesMasterId r:id="rId16"/>
+    <p:notesMasterId r:id="rId17"/>
   </p:notesMasterIdLst>
   <p:handoutMasterIdLst>
-    <p:handoutMasterId r:id="rId17"/>
+    <p:handoutMasterId r:id="rId18"/>
   </p:handoutMasterIdLst>
   <p:sldIdLst>
     <p:sldId id="256" r:id="rId5"/>
     <p:sldId id="2439" r:id="rId6"/>
     <p:sldId id="2440" r:id="rId7"/>
-    <p:sldId id="260" r:id="rId8"/>
-    <p:sldId id="2434" r:id="rId9"/>
-    <p:sldId id="258" r:id="rId10"/>
-    <p:sldId id="2442" r:id="rId11"/>
-    <p:sldId id="2433" r:id="rId12"/>
-    <p:sldId id="2438" r:id="rId13"/>
-    <p:sldId id="2441" r:id="rId14"/>
-    <p:sldId id="2443" r:id="rId15"/>
+    <p:sldId id="2442" r:id="rId8"/>
+    <p:sldId id="2444" r:id="rId9"/>
+    <p:sldId id="260" r:id="rId10"/>
+    <p:sldId id="2434" r:id="rId11"/>
+    <p:sldId id="258" r:id="rId12"/>
+    <p:sldId id="2433" r:id="rId13"/>
+    <p:sldId id="2438" r:id="rId14"/>
+    <p:sldId id="2441" r:id="rId15"/>
+    <p:sldId id="2443" r:id="rId16"/>
   </p:sldIdLst>
   <p:sldSz cx="12192000" cy="6858000"/>
   <p:notesSz cx="6858000" cy="9144000"/>
@@ -131,1122 +132,6 @@
 </p:presentation>
 </file>
 
-<file path=ppt/charts/chart1.xml><?xml version="1.0" encoding="utf-8"?>
-<c:chartSpace xmlns:c="http://schemas.openxmlformats.org/drawingml/2006/chart" xmlns:a="http://schemas.openxmlformats.org/drawingml/2006/main" xmlns:r="http://schemas.openxmlformats.org/officeDocument/2006/relationships" xmlns:c16r2="http://schemas.microsoft.com/office/drawing/2015/06/chart">
-  <c:date1904 val="0"/>
-  <c:lang val="en-US"/>
-  <c:roundedCorners val="0"/>
-  <mc:AlternateContent xmlns:mc="http://schemas.openxmlformats.org/markup-compatibility/2006">
-    <mc:Choice xmlns:c14="http://schemas.microsoft.com/office/drawing/2007/8/2/chart" Requires="c14">
-      <c14:style val="102"/>
-    </mc:Choice>
-    <mc:Fallback>
-      <c:style val="2"/>
-    </mc:Fallback>
-  </mc:AlternateContent>
-  <c:chart>
-    <c:title>
-      <c:tx>
-        <c:rich>
-          <a:bodyPr rot="0" spcFirstLastPara="1" vertOverflow="ellipsis" vert="horz" wrap="square" anchor="ctr" anchorCtr="1"/>
-          <a:lstStyle/>
-          <a:p>
-            <a:pPr>
-              <a:defRPr sz="1862" b="0" i="0" u="none" strike="noStrike" kern="1200" spc="0" baseline="0">
-                <a:solidFill>
-                  <a:schemeClr val="bg1"/>
-                </a:solidFill>
-                <a:latin typeface="+mn-lt"/>
-                <a:ea typeface="+mn-ea"/>
-                <a:cs typeface="+mn-cs"/>
-              </a:defRPr>
-            </a:pPr>
-            <a:r>
-              <a:rPr lang="en-US" dirty="0">
-                <a:solidFill>
-                  <a:schemeClr val="bg1"/>
-                </a:solidFill>
-              </a:rPr>
-              <a:t>CHART TITLE</a:t>
-            </a:r>
-          </a:p>
-        </c:rich>
-      </c:tx>
-      <c:layout>
-        <c:manualLayout>
-          <c:xMode val="edge"/>
-          <c:yMode val="edge"/>
-          <c:x val="0.39625304136253042"/>
-          <c:y val="1.2875536480686695E-2"/>
-        </c:manualLayout>
-      </c:layout>
-      <c:overlay val="0"/>
-      <c:spPr>
-        <a:noFill/>
-        <a:ln>
-          <a:noFill/>
-        </a:ln>
-        <a:effectLst/>
-      </c:spPr>
-      <c:txPr>
-        <a:bodyPr rot="0" spcFirstLastPara="1" vertOverflow="ellipsis" vert="horz" wrap="square" anchor="ctr" anchorCtr="1"/>
-        <a:lstStyle/>
-        <a:p>
-          <a:pPr>
-            <a:defRPr sz="1862" b="0" i="0" u="none" strike="noStrike" kern="1200" spc="0" baseline="0">
-              <a:solidFill>
-                <a:schemeClr val="bg1"/>
-              </a:solidFill>
-              <a:latin typeface="+mn-lt"/>
-              <a:ea typeface="+mn-ea"/>
-              <a:cs typeface="+mn-cs"/>
-            </a:defRPr>
-          </a:pPr>
-          <a:endParaRPr lang="en-US"/>
-        </a:p>
-      </c:txPr>
-    </c:title>
-    <c:autoTitleDeleted val="0"/>
-    <c:plotArea>
-      <c:layout>
-        <c:manualLayout>
-          <c:layoutTarget val="inner"/>
-          <c:xMode val="edge"/>
-          <c:yMode val="edge"/>
-          <c:x val="0.14688162154913117"/>
-          <c:y val="0.17427359670169987"/>
-          <c:w val="0.73876314730731663"/>
-          <c:h val="0.65157007198134576"/>
-        </c:manualLayout>
-      </c:layout>
-      <c:doughnutChart>
-        <c:varyColors val="1"/>
-        <c:ser>
-          <c:idx val="0"/>
-          <c:order val="0"/>
-          <c:tx>
-            <c:strRef>
-              <c:f>Лист1!$B$1</c:f>
-              <c:strCache>
-                <c:ptCount val="1"/>
-                <c:pt idx="0">
-                  <c:v>Row</c:v>
-                </c:pt>
-              </c:strCache>
-            </c:strRef>
-          </c:tx>
-          <c:spPr>
-            <a:ln>
-              <a:noFill/>
-            </a:ln>
-          </c:spPr>
-          <c:dPt>
-            <c:idx val="0"/>
-            <c:bubble3D val="0"/>
-            <c:spPr>
-              <a:solidFill>
-                <a:schemeClr val="accent1"/>
-              </a:solidFill>
-              <a:ln w="19050">
-                <a:noFill/>
-              </a:ln>
-              <a:effectLst/>
-            </c:spPr>
-            <c:extLst>
-              <c:ext xmlns:c16="http://schemas.microsoft.com/office/drawing/2014/chart" uri="{C3380CC4-5D6E-409C-BE32-E72D297353CC}">
-                <c16:uniqueId val="{00000001-52D3-4747-9723-3DDD7CD85D4A}"/>
-              </c:ext>
-            </c:extLst>
-          </c:dPt>
-          <c:dPt>
-            <c:idx val="1"/>
-            <c:bubble3D val="0"/>
-            <c:spPr>
-              <a:solidFill>
-                <a:schemeClr val="accent2"/>
-              </a:solidFill>
-              <a:ln w="19050">
-                <a:noFill/>
-              </a:ln>
-              <a:effectLst/>
-            </c:spPr>
-            <c:extLst>
-              <c:ext xmlns:c16="http://schemas.microsoft.com/office/drawing/2014/chart" uri="{C3380CC4-5D6E-409C-BE32-E72D297353CC}">
-                <c16:uniqueId val="{00000003-52D3-4747-9723-3DDD7CD85D4A}"/>
-              </c:ext>
-            </c:extLst>
-          </c:dPt>
-          <c:dPt>
-            <c:idx val="2"/>
-            <c:bubble3D val="0"/>
-            <c:spPr>
-              <a:solidFill>
-                <a:srgbClr val="C0F400"/>
-              </a:solidFill>
-              <a:ln w="19050">
-                <a:noFill/>
-              </a:ln>
-              <a:effectLst/>
-            </c:spPr>
-            <c:extLst>
-              <c:ext xmlns:c16="http://schemas.microsoft.com/office/drawing/2014/chart" uri="{C3380CC4-5D6E-409C-BE32-E72D297353CC}">
-                <c16:uniqueId val="{00000005-52D3-4747-9723-3DDD7CD85D4A}"/>
-              </c:ext>
-            </c:extLst>
-          </c:dPt>
-          <c:dPt>
-            <c:idx val="3"/>
-            <c:bubble3D val="0"/>
-            <c:spPr>
-              <a:solidFill>
-                <a:schemeClr val="accent4"/>
-              </a:solidFill>
-              <a:ln w="19050">
-                <a:noFill/>
-              </a:ln>
-              <a:effectLst/>
-            </c:spPr>
-            <c:extLst>
-              <c:ext xmlns:c16="http://schemas.microsoft.com/office/drawing/2014/chart" uri="{C3380CC4-5D6E-409C-BE32-E72D297353CC}">
-                <c16:uniqueId val="{00000007-52D3-4747-9723-3DDD7CD85D4A}"/>
-              </c:ext>
-            </c:extLst>
-          </c:dPt>
-          <c:dPt>
-            <c:idx val="4"/>
-            <c:bubble3D val="0"/>
-            <c:spPr>
-              <a:solidFill>
-                <a:schemeClr val="accent5"/>
-              </a:solidFill>
-              <a:ln w="19050">
-                <a:noFill/>
-              </a:ln>
-              <a:effectLst/>
-            </c:spPr>
-            <c:extLst>
-              <c:ext xmlns:c16="http://schemas.microsoft.com/office/drawing/2014/chart" uri="{C3380CC4-5D6E-409C-BE32-E72D297353CC}">
-                <c16:uniqueId val="{00000009-52D3-4747-9723-3DDD7CD85D4A}"/>
-              </c:ext>
-            </c:extLst>
-          </c:dPt>
-          <c:dPt>
-            <c:idx val="5"/>
-            <c:bubble3D val="0"/>
-            <c:spPr>
-              <a:solidFill>
-                <a:schemeClr val="accent6"/>
-              </a:solidFill>
-              <a:ln w="19050">
-                <a:noFill/>
-              </a:ln>
-              <a:effectLst/>
-            </c:spPr>
-            <c:extLst>
-              <c:ext xmlns:c16="http://schemas.microsoft.com/office/drawing/2014/chart" uri="{C3380CC4-5D6E-409C-BE32-E72D297353CC}">
-                <c16:uniqueId val="{0000000B-52D3-4747-9723-3DDD7CD85D4A}"/>
-              </c:ext>
-            </c:extLst>
-          </c:dPt>
-          <c:dPt>
-            <c:idx val="6"/>
-            <c:bubble3D val="0"/>
-            <c:spPr>
-              <a:solidFill>
-                <a:schemeClr val="accent1">
-                  <a:lumMod val="60000"/>
-                </a:schemeClr>
-              </a:solidFill>
-              <a:ln w="19050">
-                <a:noFill/>
-              </a:ln>
-              <a:effectLst/>
-            </c:spPr>
-            <c:extLst>
-              <c:ext xmlns:c16="http://schemas.microsoft.com/office/drawing/2014/chart" uri="{C3380CC4-5D6E-409C-BE32-E72D297353CC}">
-                <c16:uniqueId val="{0000000D-52D3-4747-9723-3DDD7CD85D4A}"/>
-              </c:ext>
-            </c:extLst>
-          </c:dPt>
-          <c:dPt>
-            <c:idx val="7"/>
-            <c:bubble3D val="0"/>
-            <c:spPr>
-              <a:solidFill>
-                <a:schemeClr val="accent2">
-                  <a:lumMod val="60000"/>
-                </a:schemeClr>
-              </a:solidFill>
-              <a:ln w="19050">
-                <a:noFill/>
-              </a:ln>
-              <a:effectLst/>
-            </c:spPr>
-            <c:extLst>
-              <c:ext xmlns:c16="http://schemas.microsoft.com/office/drawing/2014/chart" uri="{C3380CC4-5D6E-409C-BE32-E72D297353CC}">
-                <c16:uniqueId val="{0000000F-52D3-4747-9723-3DDD7CD85D4A}"/>
-              </c:ext>
-            </c:extLst>
-          </c:dPt>
-          <c:dPt>
-            <c:idx val="8"/>
-            <c:bubble3D val="0"/>
-            <c:spPr>
-              <a:solidFill>
-                <a:schemeClr val="accent3">
-                  <a:lumMod val="60000"/>
-                </a:schemeClr>
-              </a:solidFill>
-              <a:ln w="19050">
-                <a:noFill/>
-              </a:ln>
-              <a:effectLst/>
-            </c:spPr>
-            <c:extLst>
-              <c:ext xmlns:c16="http://schemas.microsoft.com/office/drawing/2014/chart" uri="{C3380CC4-5D6E-409C-BE32-E72D297353CC}">
-                <c16:uniqueId val="{00000011-52D3-4747-9723-3DDD7CD85D4A}"/>
-              </c:ext>
-            </c:extLst>
-          </c:dPt>
-          <c:dPt>
-            <c:idx val="9"/>
-            <c:bubble3D val="0"/>
-            <c:spPr>
-              <a:solidFill>
-                <a:schemeClr val="accent4">
-                  <a:lumMod val="60000"/>
-                </a:schemeClr>
-              </a:solidFill>
-              <a:ln w="19050">
-                <a:noFill/>
-              </a:ln>
-              <a:effectLst/>
-            </c:spPr>
-            <c:extLst>
-              <c:ext xmlns:c16="http://schemas.microsoft.com/office/drawing/2014/chart" uri="{C3380CC4-5D6E-409C-BE32-E72D297353CC}">
-                <c16:uniqueId val="{00000013-52D3-4747-9723-3DDD7CD85D4A}"/>
-              </c:ext>
-            </c:extLst>
-          </c:dPt>
-          <c:dPt>
-            <c:idx val="10"/>
-            <c:bubble3D val="0"/>
-            <c:spPr>
-              <a:solidFill>
-                <a:schemeClr val="accent5">
-                  <a:lumMod val="60000"/>
-                </a:schemeClr>
-              </a:solidFill>
-              <a:ln w="19050">
-                <a:noFill/>
-              </a:ln>
-              <a:effectLst/>
-            </c:spPr>
-            <c:extLst>
-              <c:ext xmlns:c16="http://schemas.microsoft.com/office/drawing/2014/chart" uri="{C3380CC4-5D6E-409C-BE32-E72D297353CC}">
-                <c16:uniqueId val="{00000015-52D3-4747-9723-3DDD7CD85D4A}"/>
-              </c:ext>
-            </c:extLst>
-          </c:dPt>
-          <c:dPt>
-            <c:idx val="11"/>
-            <c:bubble3D val="0"/>
-            <c:spPr>
-              <a:solidFill>
-                <a:schemeClr val="accent6">
-                  <a:lumMod val="60000"/>
-                </a:schemeClr>
-              </a:solidFill>
-              <a:ln w="19050">
-                <a:noFill/>
-              </a:ln>
-              <a:effectLst/>
-            </c:spPr>
-            <c:extLst>
-              <c:ext xmlns:c16="http://schemas.microsoft.com/office/drawing/2014/chart" uri="{C3380CC4-5D6E-409C-BE32-E72D297353CC}">
-                <c16:uniqueId val="{00000017-52D3-4747-9723-3DDD7CD85D4A}"/>
-              </c:ext>
-            </c:extLst>
-          </c:dPt>
-          <c:dLbls>
-            <c:spPr>
-              <a:noFill/>
-              <a:ln>
-                <a:noFill/>
-              </a:ln>
-              <a:effectLst/>
-            </c:spPr>
-            <c:txPr>
-              <a:bodyPr rot="0" spcFirstLastPara="1" vertOverflow="ellipsis" vert="horz" wrap="square" anchor="ctr" anchorCtr="1"/>
-              <a:lstStyle/>
-              <a:p>
-                <a:pPr>
-                  <a:defRPr sz="1197" b="0" i="0" u="none" strike="noStrike" kern="1200" baseline="0">
-                    <a:solidFill>
-                      <a:schemeClr val="bg1"/>
-                    </a:solidFill>
-                    <a:latin typeface="+mn-lt"/>
-                    <a:ea typeface="+mn-ea"/>
-                    <a:cs typeface="+mn-cs"/>
-                  </a:defRPr>
-                </a:pPr>
-                <a:endParaRPr lang="en-US"/>
-              </a:p>
-            </c:txPr>
-            <c:showLegendKey val="0"/>
-            <c:showVal val="0"/>
-            <c:showCatName val="0"/>
-            <c:showSerName val="0"/>
-            <c:showPercent val="1"/>
-            <c:showBubbleSize val="0"/>
-            <c:showLeaderLines val="1"/>
-            <c:leaderLines>
-              <c:spPr>
-                <a:ln w="9525" cap="flat" cmpd="sng" algn="ctr">
-                  <a:solidFill>
-                    <a:schemeClr val="tx1">
-                      <a:lumMod val="35000"/>
-                      <a:lumOff val="65000"/>
-                    </a:schemeClr>
-                  </a:solidFill>
-                  <a:round/>
-                </a:ln>
-                <a:effectLst/>
-              </c:spPr>
-            </c:leaderLines>
-            <c:extLst>
-              <c:ext xmlns:c15="http://schemas.microsoft.com/office/drawing/2012/chart" uri="{CE6537A1-D6FC-4f65-9D91-7224C49458BB}"/>
-            </c:extLst>
-          </c:dLbls>
-          <c:cat>
-            <c:strRef>
-              <c:f>Лист1!$A$2:$A$13</c:f>
-              <c:strCache>
-                <c:ptCount val="5"/>
-                <c:pt idx="0">
-                  <c:v>Jan </c:v>
-                </c:pt>
-                <c:pt idx="1">
-                  <c:v>Feb</c:v>
-                </c:pt>
-                <c:pt idx="2">
-                  <c:v>Mar</c:v>
-                </c:pt>
-                <c:pt idx="3">
-                  <c:v>Apr</c:v>
-                </c:pt>
-                <c:pt idx="4">
-                  <c:v>May</c:v>
-                </c:pt>
-              </c:strCache>
-            </c:strRef>
-          </c:cat>
-          <c:val>
-            <c:numRef>
-              <c:f>Лист1!$B$2:$B$13</c:f>
-              <c:numCache>
-                <c:formatCode>General</c:formatCode>
-                <c:ptCount val="12"/>
-                <c:pt idx="0">
-                  <c:v>10000</c:v>
-                </c:pt>
-                <c:pt idx="1">
-                  <c:v>17000</c:v>
-                </c:pt>
-                <c:pt idx="2">
-                  <c:v>15000</c:v>
-                </c:pt>
-                <c:pt idx="3">
-                  <c:v>25000</c:v>
-                </c:pt>
-                <c:pt idx="4">
-                  <c:v>21000</c:v>
-                </c:pt>
-              </c:numCache>
-            </c:numRef>
-          </c:val>
-          <c:extLst>
-            <c:ext xmlns:c16="http://schemas.microsoft.com/office/drawing/2014/chart" uri="{C3380CC4-5D6E-409C-BE32-E72D297353CC}">
-              <c16:uniqueId val="{00000018-52D3-4747-9723-3DDD7CD85D4A}"/>
-            </c:ext>
-          </c:extLst>
-        </c:ser>
-        <c:dLbls>
-          <c:showLegendKey val="0"/>
-          <c:showVal val="0"/>
-          <c:showCatName val="0"/>
-          <c:showSerName val="0"/>
-          <c:showPercent val="1"/>
-          <c:showBubbleSize val="0"/>
-          <c:showLeaderLines val="1"/>
-        </c:dLbls>
-        <c:firstSliceAng val="0"/>
-        <c:holeSize val="70"/>
-      </c:doughnutChart>
-      <c:spPr>
-        <a:noFill/>
-        <a:ln>
-          <a:noFill/>
-        </a:ln>
-        <a:effectLst/>
-      </c:spPr>
-    </c:plotArea>
-    <c:legend>
-      <c:legendPos val="t"/>
-      <c:legendEntry>
-        <c:idx val="5"/>
-        <c:delete val="1"/>
-      </c:legendEntry>
-      <c:legendEntry>
-        <c:idx val="6"/>
-        <c:delete val="1"/>
-      </c:legendEntry>
-      <c:legendEntry>
-        <c:idx val="7"/>
-        <c:delete val="1"/>
-      </c:legendEntry>
-      <c:legendEntry>
-        <c:idx val="8"/>
-        <c:delete val="1"/>
-      </c:legendEntry>
-      <c:legendEntry>
-        <c:idx val="9"/>
-        <c:delete val="1"/>
-      </c:legendEntry>
-      <c:legendEntry>
-        <c:idx val="10"/>
-        <c:delete val="1"/>
-      </c:legendEntry>
-      <c:legendEntry>
-        <c:idx val="11"/>
-        <c:delete val="1"/>
-      </c:legendEntry>
-      <c:layout>
-        <c:manualLayout>
-          <c:xMode val="edge"/>
-          <c:yMode val="edge"/>
-          <c:x val="0"/>
-          <c:y val="0.9026736169781352"/>
-          <c:w val="1"/>
-          <c:h val="6.0710858031158124E-2"/>
-        </c:manualLayout>
-      </c:layout>
-      <c:overlay val="0"/>
-      <c:spPr>
-        <a:noFill/>
-        <a:ln>
-          <a:noFill/>
-        </a:ln>
-        <a:effectLst/>
-      </c:spPr>
-      <c:txPr>
-        <a:bodyPr rot="0" spcFirstLastPara="1" vertOverflow="ellipsis" vert="horz" wrap="square" anchor="ctr" anchorCtr="1"/>
-        <a:lstStyle/>
-        <a:p>
-          <a:pPr>
-            <a:defRPr sz="1050" b="1" i="0" u="none" strike="noStrike" kern="1200" baseline="0">
-              <a:solidFill>
-                <a:schemeClr val="bg1"/>
-              </a:solidFill>
-              <a:latin typeface="+mn-lt"/>
-              <a:ea typeface="+mn-ea"/>
-              <a:cs typeface="+mn-cs"/>
-            </a:defRPr>
-          </a:pPr>
-          <a:endParaRPr lang="en-US"/>
-        </a:p>
-      </c:txPr>
-    </c:legend>
-    <c:plotVisOnly val="1"/>
-    <c:dispBlanksAs val="gap"/>
-    <c:showDLblsOverMax val="0"/>
-  </c:chart>
-  <c:spPr>
-    <a:noFill/>
-    <a:ln>
-      <a:noFill/>
-    </a:ln>
-    <a:effectLst/>
-  </c:spPr>
-  <c:txPr>
-    <a:bodyPr/>
-    <a:lstStyle/>
-    <a:p>
-      <a:pPr>
-        <a:defRPr>
-          <a:solidFill>
-            <a:schemeClr val="bg1"/>
-          </a:solidFill>
-        </a:defRPr>
-      </a:pPr>
-      <a:endParaRPr lang="en-US"/>
-    </a:p>
-  </c:txPr>
-  <c:externalData r:id="rId3">
-    <c:autoUpdate val="0"/>
-  </c:externalData>
-</c:chartSpace>
-</file>
-
-<file path=ppt/charts/colors1.xml><?xml version="1.0" encoding="utf-8"?>
-<cs:colorStyle xmlns:cs="http://schemas.microsoft.com/office/drawing/2012/chartStyle" xmlns:a="http://schemas.openxmlformats.org/drawingml/2006/main" meth="cycle" id="10">
-  <a:schemeClr val="accent1"/>
-  <a:schemeClr val="accent2"/>
-  <a:schemeClr val="accent3"/>
-  <a:schemeClr val="accent4"/>
-  <a:schemeClr val="accent5"/>
-  <a:schemeClr val="accent6"/>
-  <cs:variation/>
-  <cs:variation>
-    <a:lumMod val="60000"/>
-  </cs:variation>
-  <cs:variation>
-    <a:lumMod val="80000"/>
-    <a:lumOff val="20000"/>
-  </cs:variation>
-  <cs:variation>
-    <a:lumMod val="80000"/>
-  </cs:variation>
-  <cs:variation>
-    <a:lumMod val="60000"/>
-    <a:lumOff val="40000"/>
-  </cs:variation>
-  <cs:variation>
-    <a:lumMod val="50000"/>
-  </cs:variation>
-  <cs:variation>
-    <a:lumMod val="70000"/>
-    <a:lumOff val="30000"/>
-  </cs:variation>
-  <cs:variation>
-    <a:lumMod val="70000"/>
-  </cs:variation>
-  <cs:variation>
-    <a:lumMod val="50000"/>
-    <a:lumOff val="50000"/>
-  </cs:variation>
-</cs:colorStyle>
-</file>
-
-<file path=ppt/charts/style1.xml><?xml version="1.0" encoding="utf-8"?>
-<cs:chartStyle xmlns:cs="http://schemas.microsoft.com/office/drawing/2012/chartStyle" xmlns:a="http://schemas.openxmlformats.org/drawingml/2006/main" id="251">
-  <cs:axisTitle>
-    <cs:lnRef idx="0"/>
-    <cs:fillRef idx="0"/>
-    <cs:effectRef idx="0"/>
-    <cs:fontRef idx="minor">
-      <a:schemeClr val="tx1">
-        <a:lumMod val="65000"/>
-        <a:lumOff val="35000"/>
-      </a:schemeClr>
-    </cs:fontRef>
-    <cs:defRPr sz="1330" kern="1200"/>
-  </cs:axisTitle>
-  <cs:categoryAxis>
-    <cs:lnRef idx="0"/>
-    <cs:fillRef idx="0"/>
-    <cs:effectRef idx="0"/>
-    <cs:fontRef idx="minor">
-      <a:schemeClr val="tx1">
-        <a:lumMod val="65000"/>
-        <a:lumOff val="35000"/>
-      </a:schemeClr>
-    </cs:fontRef>
-    <cs:spPr>
-      <a:ln w="9525" cap="flat" cmpd="sng" algn="ctr">
-        <a:solidFill>
-          <a:schemeClr val="tx1">
-            <a:lumMod val="15000"/>
-            <a:lumOff val="85000"/>
-          </a:schemeClr>
-        </a:solidFill>
-        <a:round/>
-      </a:ln>
-    </cs:spPr>
-    <cs:defRPr sz="1197" kern="1200"/>
-  </cs:categoryAxis>
-  <cs:chartArea mods="allowNoFillOverride allowNoLineOverride">
-    <cs:lnRef idx="0"/>
-    <cs:fillRef idx="0"/>
-    <cs:effectRef idx="0"/>
-    <cs:fontRef idx="minor">
-      <a:schemeClr val="tx1"/>
-    </cs:fontRef>
-    <cs:spPr>
-      <a:solidFill>
-        <a:schemeClr val="bg1"/>
-      </a:solidFill>
-      <a:ln w="9525" cap="flat" cmpd="sng" algn="ctr">
-        <a:solidFill>
-          <a:schemeClr val="tx1">
-            <a:lumMod val="15000"/>
-            <a:lumOff val="85000"/>
-          </a:schemeClr>
-        </a:solidFill>
-        <a:round/>
-      </a:ln>
-    </cs:spPr>
-    <cs:defRPr sz="1197" kern="1200"/>
-  </cs:chartArea>
-  <cs:dataLabel>
-    <cs:lnRef idx="0"/>
-    <cs:fillRef idx="0"/>
-    <cs:effectRef idx="0"/>
-    <cs:fontRef idx="minor">
-      <a:schemeClr val="tx1">
-        <a:lumMod val="75000"/>
-        <a:lumOff val="25000"/>
-      </a:schemeClr>
-    </cs:fontRef>
-    <cs:defRPr sz="1197" kern="1200"/>
-  </cs:dataLabel>
-  <cs:dataLabelCallout>
-    <cs:lnRef idx="0"/>
-    <cs:fillRef idx="0"/>
-    <cs:effectRef idx="0"/>
-    <cs:fontRef idx="minor">
-      <a:schemeClr val="dk1">
-        <a:lumMod val="65000"/>
-        <a:lumOff val="35000"/>
-      </a:schemeClr>
-    </cs:fontRef>
-    <cs:spPr>
-      <a:solidFill>
-        <a:schemeClr val="lt1"/>
-      </a:solidFill>
-      <a:ln>
-        <a:solidFill>
-          <a:schemeClr val="dk1">
-            <a:lumMod val="25000"/>
-            <a:lumOff val="75000"/>
-          </a:schemeClr>
-        </a:solidFill>
-      </a:ln>
-    </cs:spPr>
-    <cs:defRPr sz="1197" kern="1200"/>
-    <cs:bodyPr rot="0" spcFirstLastPara="1" vertOverflow="clip" horzOverflow="clip" vert="horz" wrap="square" lIns="36576" tIns="18288" rIns="36576" bIns="18288" anchor="ctr" anchorCtr="1">
-      <a:spAutoFit/>
-    </cs:bodyPr>
-  </cs:dataLabelCallout>
-  <cs:dataPoint>
-    <cs:lnRef idx="0"/>
-    <cs:fillRef idx="1">
-      <cs:styleClr val="auto"/>
-    </cs:fillRef>
-    <cs:effectRef idx="0"/>
-    <cs:fontRef idx="minor">
-      <a:schemeClr val="tx1"/>
-    </cs:fontRef>
-    <cs:spPr>
-      <a:ln w="19050">
-        <a:solidFill>
-          <a:schemeClr val="lt1"/>
-        </a:solidFill>
-      </a:ln>
-    </cs:spPr>
-  </cs:dataPoint>
-  <cs:dataPoint3D>
-    <cs:lnRef idx="0"/>
-    <cs:fillRef idx="1">
-      <cs:styleClr val="auto"/>
-    </cs:fillRef>
-    <cs:effectRef idx="0"/>
-    <cs:fontRef idx="minor">
-      <a:schemeClr val="tx1"/>
-    </cs:fontRef>
-    <cs:spPr>
-      <a:ln w="25400">
-        <a:solidFill>
-          <a:schemeClr val="lt1"/>
-        </a:solidFill>
-      </a:ln>
-    </cs:spPr>
-  </cs:dataPoint3D>
-  <cs:dataPointLine>
-    <cs:lnRef idx="0">
-      <cs:styleClr val="auto"/>
-    </cs:lnRef>
-    <cs:fillRef idx="0"/>
-    <cs:effectRef idx="0"/>
-    <cs:fontRef idx="minor">
-      <a:schemeClr val="tx1"/>
-    </cs:fontRef>
-    <cs:spPr>
-      <a:ln w="28575" cap="rnd">
-        <a:solidFill>
-          <a:schemeClr val="phClr"/>
-        </a:solidFill>
-        <a:round/>
-      </a:ln>
-    </cs:spPr>
-  </cs:dataPointLine>
-  <cs:dataPointMarker>
-    <cs:lnRef idx="0">
-      <cs:styleClr val="auto"/>
-    </cs:lnRef>
-    <cs:fillRef idx="1">
-      <cs:styleClr val="auto"/>
-    </cs:fillRef>
-    <cs:effectRef idx="0"/>
-    <cs:fontRef idx="minor">
-      <a:schemeClr val="tx1"/>
-    </cs:fontRef>
-    <cs:spPr>
-      <a:ln w="9525">
-        <a:solidFill>
-          <a:schemeClr val="phClr"/>
-        </a:solidFill>
-      </a:ln>
-    </cs:spPr>
-  </cs:dataPointMarker>
-  <cs:dataPointMarkerLayout symbol="circle" size="5"/>
-  <cs:dataPointWireframe>
-    <cs:lnRef idx="0">
-      <cs:styleClr val="auto"/>
-    </cs:lnRef>
-    <cs:fillRef idx="0"/>
-    <cs:effectRef idx="0"/>
-    <cs:fontRef idx="minor">
-      <a:schemeClr val="tx1"/>
-    </cs:fontRef>
-    <cs:spPr>
-      <a:ln w="9525" cap="rnd">
-        <a:solidFill>
-          <a:schemeClr val="phClr"/>
-        </a:solidFill>
-        <a:round/>
-      </a:ln>
-    </cs:spPr>
-  </cs:dataPointWireframe>
-  <cs:dataTable>
-    <cs:lnRef idx="0"/>
-    <cs:fillRef idx="0"/>
-    <cs:effectRef idx="0"/>
-    <cs:fontRef idx="minor">
-      <a:schemeClr val="tx1">
-        <a:lumMod val="65000"/>
-        <a:lumOff val="35000"/>
-      </a:schemeClr>
-    </cs:fontRef>
-    <cs:spPr>
-      <a:noFill/>
-      <a:ln w="9525" cap="flat" cmpd="sng" algn="ctr">
-        <a:solidFill>
-          <a:schemeClr val="tx1">
-            <a:lumMod val="15000"/>
-            <a:lumOff val="85000"/>
-          </a:schemeClr>
-        </a:solidFill>
-        <a:round/>
-      </a:ln>
-    </cs:spPr>
-    <cs:defRPr sz="1197" kern="1200"/>
-  </cs:dataTable>
-  <cs:downBar>
-    <cs:lnRef idx="0"/>
-    <cs:fillRef idx="0"/>
-    <cs:effectRef idx="0"/>
-    <cs:fontRef idx="minor">
-      <a:schemeClr val="tx1"/>
-    </cs:fontRef>
-    <cs:spPr>
-      <a:solidFill>
-        <a:schemeClr val="dk1">
-          <a:lumMod val="75000"/>
-          <a:lumOff val="25000"/>
-        </a:schemeClr>
-      </a:solidFill>
-      <a:ln w="9525" cap="flat" cmpd="sng" algn="ctr">
-        <a:solidFill>
-          <a:schemeClr val="tx1">
-            <a:lumMod val="65000"/>
-            <a:lumOff val="35000"/>
-          </a:schemeClr>
-        </a:solidFill>
-        <a:round/>
-      </a:ln>
-    </cs:spPr>
-  </cs:downBar>
-  <cs:dropLine>
-    <cs:lnRef idx="0"/>
-    <cs:fillRef idx="0"/>
-    <cs:effectRef idx="0"/>
-    <cs:fontRef idx="minor">
-      <a:schemeClr val="tx1"/>
-    </cs:fontRef>
-    <cs:spPr>
-      <a:ln w="9525" cap="flat" cmpd="sng" algn="ctr">
-        <a:solidFill>
-          <a:schemeClr val="tx1">
-            <a:lumMod val="35000"/>
-            <a:lumOff val="65000"/>
-          </a:schemeClr>
-        </a:solidFill>
-        <a:round/>
-      </a:ln>
-    </cs:spPr>
-  </cs:dropLine>
-  <cs:errorBar>
-    <cs:lnRef idx="0"/>
-    <cs:fillRef idx="0"/>
-    <cs:effectRef idx="0"/>
-    <cs:fontRef idx="minor">
-      <a:schemeClr val="tx1"/>
-    </cs:fontRef>
-    <cs:spPr>
-      <a:ln w="9525" cap="flat" cmpd="sng" algn="ctr">
-        <a:solidFill>
-          <a:schemeClr val="tx1">
-            <a:lumMod val="65000"/>
-            <a:lumOff val="35000"/>
-          </a:schemeClr>
-        </a:solidFill>
-        <a:round/>
-      </a:ln>
-    </cs:spPr>
-  </cs:errorBar>
-  <cs:floor>
-    <cs:lnRef idx="0"/>
-    <cs:fillRef idx="0"/>
-    <cs:effectRef idx="0"/>
-    <cs:fontRef idx="minor">
-      <a:schemeClr val="tx1"/>
-    </cs:fontRef>
-    <cs:spPr>
-      <a:noFill/>
-      <a:ln>
-        <a:noFill/>
-      </a:ln>
-    </cs:spPr>
-  </cs:floor>
-  <cs:gridlineMajor>
-    <cs:lnRef idx="0"/>
-    <cs:fillRef idx="0"/>
-    <cs:effectRef idx="0"/>
-    <cs:fontRef idx="minor">
-      <a:schemeClr val="tx1"/>
-    </cs:fontRef>
-    <cs:spPr>
-      <a:ln w="9525" cap="flat" cmpd="sng" algn="ctr">
-        <a:solidFill>
-          <a:schemeClr val="tx1">
-            <a:lumMod val="15000"/>
-            <a:lumOff val="85000"/>
-          </a:schemeClr>
-        </a:solidFill>
-        <a:round/>
-      </a:ln>
-    </cs:spPr>
-  </cs:gridlineMajor>
-  <cs:gridlineMinor>
-    <cs:lnRef idx="0"/>
-    <cs:fillRef idx="0"/>
-    <cs:effectRef idx="0"/>
-    <cs:fontRef idx="minor">
-      <a:schemeClr val="tx1"/>
-    </cs:fontRef>
-    <cs:spPr>
-      <a:ln w="9525" cap="flat" cmpd="sng" algn="ctr">
-        <a:solidFill>
-          <a:schemeClr val="tx1">
-            <a:lumMod val="5000"/>
-            <a:lumOff val="95000"/>
-          </a:schemeClr>
-        </a:solidFill>
-        <a:round/>
-      </a:ln>
-    </cs:spPr>
-  </cs:gridlineMinor>
-  <cs:hiLoLine>
-    <cs:lnRef idx="0"/>
-    <cs:fillRef idx="0"/>
-    <cs:effectRef idx="0"/>
-    <cs:fontRef idx="minor">
-      <a:schemeClr val="tx1"/>
-    </cs:fontRef>
-    <cs:spPr>
-      <a:ln w="9525" cap="flat" cmpd="sng" algn="ctr">
-        <a:solidFill>
-          <a:schemeClr val="tx1">
-            <a:lumMod val="50000"/>
-            <a:lumOff val="50000"/>
-          </a:schemeClr>
-        </a:solidFill>
-        <a:round/>
-      </a:ln>
-    </cs:spPr>
-  </cs:hiLoLine>
-  <cs:leaderLine>
-    <cs:lnRef idx="0"/>
-    <cs:fillRef idx="0"/>
-    <cs:effectRef idx="0"/>
-    <cs:fontRef idx="minor">
-      <a:schemeClr val="tx1"/>
-    </cs:fontRef>
-    <cs:spPr>
-      <a:ln w="9525" cap="flat" cmpd="sng" algn="ctr">
-        <a:solidFill>
-          <a:schemeClr val="tx1">
-            <a:lumMod val="35000"/>
-            <a:lumOff val="65000"/>
-          </a:schemeClr>
-        </a:solidFill>
-        <a:round/>
-      </a:ln>
-    </cs:spPr>
-  </cs:leaderLine>
-  <cs:legend>
-    <cs:lnRef idx="0"/>
-    <cs:fillRef idx="0"/>
-    <cs:effectRef idx="0"/>
-    <cs:fontRef idx="minor">
-      <a:schemeClr val="tx1">
-        <a:lumMod val="65000"/>
-        <a:lumOff val="35000"/>
-      </a:schemeClr>
-    </cs:fontRef>
-    <cs:defRPr sz="1197" kern="1200"/>
-  </cs:legend>
-  <cs:plotArea mods="allowNoFillOverride allowNoLineOverride">
-    <cs:lnRef idx="0"/>
-    <cs:fillRef idx="0"/>
-    <cs:effectRef idx="0"/>
-    <cs:fontRef idx="minor">
-      <a:schemeClr val="tx1"/>
-    </cs:fontRef>
-  </cs:plotArea>
-  <cs:plotArea3D mods="allowNoFillOverride allowNoLineOverride">
-    <cs:lnRef idx="0"/>
-    <cs:fillRef idx="0"/>
-    <cs:effectRef idx="0"/>
-    <cs:fontRef idx="minor">
-      <a:schemeClr val="tx1"/>
-    </cs:fontRef>
-  </cs:plotArea3D>
-  <cs:seriesAxis>
-    <cs:lnRef idx="0"/>
-    <cs:fillRef idx="0"/>
-    <cs:effectRef idx="0"/>
-    <cs:fontRef idx="minor">
-      <a:schemeClr val="tx1">
-        <a:lumMod val="65000"/>
-        <a:lumOff val="35000"/>
-      </a:schemeClr>
-    </cs:fontRef>
-    <cs:defRPr sz="1197" kern="1200"/>
-  </cs:seriesAxis>
-  <cs:seriesLine>
-    <cs:lnRef idx="0"/>
-    <cs:fillRef idx="0"/>
-    <cs:effectRef idx="0"/>
-    <cs:fontRef idx="minor">
-      <a:schemeClr val="tx1"/>
-    </cs:fontRef>
-    <cs:spPr>
-      <a:ln w="9525" cap="flat" cmpd="sng" algn="ctr">
-        <a:solidFill>
-          <a:schemeClr val="tx1">
-            <a:lumMod val="35000"/>
-            <a:lumOff val="65000"/>
-          </a:schemeClr>
-        </a:solidFill>
-        <a:round/>
-      </a:ln>
-    </cs:spPr>
-  </cs:seriesLine>
-  <cs:title>
-    <cs:lnRef idx="0"/>
-    <cs:fillRef idx="0"/>
-    <cs:effectRef idx="0"/>
-    <cs:fontRef idx="minor">
-      <a:schemeClr val="tx1">
-        <a:lumMod val="65000"/>
-        <a:lumOff val="35000"/>
-      </a:schemeClr>
-    </cs:fontRef>
-    <cs:defRPr sz="1862" b="0" kern="1200" spc="0" baseline="0"/>
-  </cs:title>
-  <cs:trendline>
-    <cs:lnRef idx="0">
-      <cs:styleClr val="auto"/>
-    </cs:lnRef>
-    <cs:fillRef idx="0"/>
-    <cs:effectRef idx="0"/>
-    <cs:fontRef idx="minor">
-      <a:schemeClr val="tx1"/>
-    </cs:fontRef>
-    <cs:spPr>
-      <a:ln w="19050" cap="rnd">
-        <a:solidFill>
-          <a:schemeClr val="phClr"/>
-        </a:solidFill>
-        <a:prstDash val="sysDot"/>
-      </a:ln>
-    </cs:spPr>
-  </cs:trendline>
-  <cs:trendlineLabel>
-    <cs:lnRef idx="0"/>
-    <cs:fillRef idx="0"/>
-    <cs:effectRef idx="0"/>
-    <cs:fontRef idx="minor">
-      <a:schemeClr val="tx1">
-        <a:lumMod val="65000"/>
-        <a:lumOff val="35000"/>
-      </a:schemeClr>
-    </cs:fontRef>
-    <cs:defRPr sz="1197" kern="1200"/>
-  </cs:trendlineLabel>
-  <cs:upBar>
-    <cs:lnRef idx="0"/>
-    <cs:fillRef idx="0"/>
-    <cs:effectRef idx="0"/>
-    <cs:fontRef idx="minor">
-      <a:schemeClr val="tx1"/>
-    </cs:fontRef>
-    <cs:spPr>
-      <a:solidFill>
-        <a:schemeClr val="lt1"/>
-      </a:solidFill>
-      <a:ln w="9525" cap="flat" cmpd="sng" algn="ctr">
-        <a:solidFill>
-          <a:schemeClr val="tx1">
-            <a:lumMod val="65000"/>
-            <a:lumOff val="35000"/>
-          </a:schemeClr>
-        </a:solidFill>
-        <a:round/>
-      </a:ln>
-    </cs:spPr>
-  </cs:upBar>
-  <cs:valueAxis>
-    <cs:lnRef idx="0"/>
-    <cs:fillRef idx="0"/>
-    <cs:effectRef idx="0"/>
-    <cs:fontRef idx="minor">
-      <a:schemeClr val="tx1">
-        <a:lumMod val="65000"/>
-        <a:lumOff val="35000"/>
-      </a:schemeClr>
-    </cs:fontRef>
-    <cs:defRPr sz="1197" kern="1200"/>
-  </cs:valueAxis>
-  <cs:wall>
-    <cs:lnRef idx="0"/>
-    <cs:fillRef idx="0"/>
-    <cs:effectRef idx="0"/>
-    <cs:fontRef idx="minor">
-      <a:schemeClr val="tx1"/>
-    </cs:fontRef>
-    <cs:spPr>
-      <a:noFill/>
-      <a:ln>
-        <a:noFill/>
-      </a:ln>
-    </cs:spPr>
-  </cs:wall>
-</cs:chartStyle>
-</file>
-
 <file path=ppt/handoutMasters/handoutMaster1.xml><?xml version="1.0" encoding="utf-8"?>
 <p:handoutMaster xmlns:a="http://schemas.openxmlformats.org/drawingml/2006/main" xmlns:r="http://schemas.openxmlformats.org/officeDocument/2006/relationships" xmlns:p="http://schemas.openxmlformats.org/presentationml/2006/main">
   <p:cSld>
@@ -1341,7 +226,7 @@
           <a:p>
             <a:fld id="{D1CB9CF0-A540-4793-A5F3-F4917CFDDCB6}" type="datetimeFigureOut">
               <a:rPr lang="en-US" smtClean="0"/>
-              <a:t>7/12/2021</a:t>
+              <a:t>7/20/2021</a:t>
             </a:fld>
             <a:endParaRPr lang="en-US" dirty="0"/>
           </a:p>
@@ -1518,7 +403,7 @@
           <a:p>
             <a:fld id="{EDA03753-A5BE-4D79-AEA9-C0A65A6F8851}" type="datetimeFigureOut">
               <a:rPr lang="en-US" smtClean="0"/>
-              <a:t>7/12/2021</a:t>
+              <a:t>7/20/2021</a:t>
             </a:fld>
             <a:endParaRPr lang="en-US" dirty="0"/>
           </a:p>
@@ -1934,7 +819,7 @@
           <a:p>
             <a:fld id="{AA3BE989-76B8-4F13-9267-01FDA45C437A}" type="slidenum">
               <a:rPr lang="en-US" smtClean="0"/>
-              <a:t>4</a:t>
+              <a:t>6</a:t>
             </a:fld>
             <a:endParaRPr lang="en-US" dirty="0"/>
           </a:p>
@@ -2018,7 +903,7 @@
           <a:p>
             <a:fld id="{AA3BE989-76B8-4F13-9267-01FDA45C437A}" type="slidenum">
               <a:rPr lang="en-US" smtClean="0"/>
-              <a:t>9</a:t>
+              <a:t>10</a:t>
             </a:fld>
             <a:endParaRPr lang="en-US" dirty="0"/>
           </a:p>
@@ -11654,14 +10539,7 @@
           <a:p>
             <a:r>
               <a:rPr lang="en-US" dirty="0"/>
-              <a:t>YOUR TITLE </a:t>
-            </a:r>
-            <a:br>
-              <a:rPr lang="en-US" dirty="0"/>
-            </a:br>
-            <a:r>
-              <a:rPr lang="en-US" dirty="0"/>
-              <a:t>GOES HERE</a:t>
+              <a:t>Building electric vehicle infrastructure</a:t>
             </a:r>
           </a:p>
         </p:txBody>
@@ -11689,7 +10567,7 @@
           <a:p>
             <a:r>
               <a:rPr lang="en-US" dirty="0"/>
-              <a:t>SUBTITLE GOES HERE</a:t>
+              <a:t>Louisa Reilly</a:t>
             </a:r>
           </a:p>
         </p:txBody>
@@ -11708,6 +10586,505 @@
 </file>
 
 <file path=ppt/slides/slide10.xml><?xml version="1.0" encoding="utf-8"?>
+<p:sld xmlns:a="http://schemas.openxmlformats.org/drawingml/2006/main" xmlns:r="http://schemas.openxmlformats.org/officeDocument/2006/relationships" xmlns:p="http://schemas.openxmlformats.org/presentationml/2006/main">
+  <p:cSld>
+    <p:spTree>
+      <p:nvGrpSpPr>
+        <p:cNvPr id="1" name=""/>
+        <p:cNvGrpSpPr/>
+        <p:nvPr/>
+      </p:nvGrpSpPr>
+      <p:grpSpPr>
+        <a:xfrm>
+          <a:off x="0" y="0"/>
+          <a:ext cx="0" cy="0"/>
+          <a:chOff x="0" y="0"/>
+          <a:chExt cx="0" cy="0"/>
+        </a:xfrm>
+      </p:grpSpPr>
+      <p:sp>
+        <p:nvSpPr>
+          <p:cNvPr id="8" name="Title 7" hidden="1">
+            <a:extLst>
+              <a:ext uri="{FF2B5EF4-FFF2-40B4-BE49-F238E27FC236}">
+                <a16:creationId xmlns:a16="http://schemas.microsoft.com/office/drawing/2014/main" id="{097D2725-75F4-45AA-950F-2F67BBF8F754}"/>
+              </a:ext>
+            </a:extLst>
+          </p:cNvPr>
+          <p:cNvSpPr>
+            <a:spLocks noGrp="1"/>
+          </p:cNvSpPr>
+          <p:nvPr>
+            <p:ph type="title"/>
+          </p:nvPr>
+        </p:nvSpPr>
+        <p:spPr>
+          <a:xfrm>
+            <a:off x="595884" y="0"/>
+            <a:ext cx="11000232" cy="1188720"/>
+          </a:xfrm>
+        </p:spPr>
+        <p:txBody>
+          <a:bodyPr/>
+          <a:lstStyle/>
+          <a:p>
+            <a:r>
+              <a:rPr lang="en-US" dirty="0"/>
+              <a:t>Title:</a:t>
+            </a:r>
+          </a:p>
+        </p:txBody>
+      </p:sp>
+      <p:pic>
+        <p:nvPicPr>
+          <p:cNvPr id="5" name="Picture Placeholder 4" descr="Abstract Building" title="Abstract Building">
+            <a:extLst>
+              <a:ext uri="{FF2B5EF4-FFF2-40B4-BE49-F238E27FC236}">
+                <a16:creationId xmlns:a16="http://schemas.microsoft.com/office/drawing/2014/main" id="{A0DC386B-E165-424D-B694-E2C45FFA4071}"/>
+              </a:ext>
+            </a:extLst>
+          </p:cNvPr>
+          <p:cNvPicPr>
+            <a:picLocks noGrp="1" noChangeAspect="1"/>
+          </p:cNvPicPr>
+          <p:nvPr>
+            <p:ph type="pic" sz="quarter" idx="10"/>
+          </p:nvPr>
+        </p:nvPicPr>
+        <p:blipFill>
+          <a:blip r:embed="rId3">
+            <a:extLst>
+              <a:ext uri="{28A0092B-C50C-407E-A947-70E740481C1C}">
+                <a14:useLocalDpi xmlns:a14="http://schemas.microsoft.com/office/drawing/2010/main" val="0"/>
+              </a:ext>
+            </a:extLst>
+          </a:blip>
+          <a:srcRect/>
+          <a:stretch>
+            <a:fillRect/>
+          </a:stretch>
+        </p:blipFill>
+        <p:spPr/>
+      </p:pic>
+      <p:sp>
+        <p:nvSpPr>
+          <p:cNvPr id="11" name="Rectangle 10">
+            <a:extLst>
+              <a:ext uri="{FF2B5EF4-FFF2-40B4-BE49-F238E27FC236}">
+                <a16:creationId xmlns:a16="http://schemas.microsoft.com/office/drawing/2014/main" id="{618826A1-4E90-405A-AE28-5500B0A362E3}"/>
+              </a:ext>
+              <a:ext uri="{C183D7F6-B498-43B3-948B-1728B52AA6E4}">
+                <adec:decorative xmlns:adec="http://schemas.microsoft.com/office/drawing/2017/decorative" val="1"/>
+              </a:ext>
+            </a:extLst>
+          </p:cNvPr>
+          <p:cNvSpPr/>
+          <p:nvPr/>
+        </p:nvSpPr>
+        <p:spPr>
+          <a:xfrm flipH="1">
+            <a:off x="6568221" y="4076700"/>
+            <a:ext cx="5386926" cy="2131595"/>
+          </a:xfrm>
+          <a:prstGeom prst="rect">
+            <a:avLst/>
+          </a:prstGeom>
+          <a:gradFill>
+            <a:gsLst>
+              <a:gs pos="0">
+                <a:srgbClr val="038B30">
+                  <a:alpha val="70000"/>
+                </a:srgbClr>
+              </a:gs>
+              <a:gs pos="100000">
+                <a:srgbClr val="C0F400">
+                  <a:alpha val="70000"/>
+                </a:srgbClr>
+              </a:gs>
+              <a:gs pos="50000">
+                <a:srgbClr val="05EE55">
+                  <a:alpha val="70000"/>
+                </a:srgbClr>
+              </a:gs>
+            </a:gsLst>
+            <a:lin ang="16200000" scaled="1"/>
+          </a:gradFill>
+          <a:ln>
+            <a:noFill/>
+          </a:ln>
+        </p:spPr>
+        <p:style>
+          <a:lnRef idx="2">
+            <a:schemeClr val="accent1">
+              <a:shade val="50000"/>
+            </a:schemeClr>
+          </a:lnRef>
+          <a:fillRef idx="1">
+            <a:schemeClr val="accent1"/>
+          </a:fillRef>
+          <a:effectRef idx="0">
+            <a:schemeClr val="accent1"/>
+          </a:effectRef>
+          <a:fontRef idx="minor">
+            <a:schemeClr val="lt1"/>
+          </a:fontRef>
+        </p:style>
+        <p:txBody>
+          <a:bodyPr rtlCol="0" anchor="ctr"/>
+          <a:lstStyle/>
+          <a:p>
+            <a:pPr algn="ctr"/>
+            <a:endParaRPr lang="en-US" dirty="0"/>
+          </a:p>
+        </p:txBody>
+      </p:sp>
+      <p:sp>
+        <p:nvSpPr>
+          <p:cNvPr id="10" name="Rectangle 9">
+            <a:extLst>
+              <a:ext uri="{FF2B5EF4-FFF2-40B4-BE49-F238E27FC236}">
+                <a16:creationId xmlns:a16="http://schemas.microsoft.com/office/drawing/2014/main" id="{0783A1B7-34FF-4F2F-A68D-A3D22C770FCB}"/>
+              </a:ext>
+              <a:ext uri="{C183D7F6-B498-43B3-948B-1728B52AA6E4}">
+                <adec:decorative xmlns:adec="http://schemas.microsoft.com/office/drawing/2017/decorative" val="1"/>
+              </a:ext>
+            </a:extLst>
+          </p:cNvPr>
+          <p:cNvSpPr/>
+          <p:nvPr/>
+        </p:nvSpPr>
+        <p:spPr>
+          <a:xfrm flipH="1">
+            <a:off x="791413" y="502215"/>
+            <a:ext cx="10638585" cy="5706080"/>
+          </a:xfrm>
+          <a:prstGeom prst="rect">
+            <a:avLst/>
+          </a:prstGeom>
+          <a:noFill/>
+          <a:ln w="88900">
+            <a:solidFill>
+              <a:schemeClr val="bg1"/>
+            </a:solidFill>
+          </a:ln>
+        </p:spPr>
+        <p:style>
+          <a:lnRef idx="2">
+            <a:schemeClr val="accent1">
+              <a:shade val="50000"/>
+            </a:schemeClr>
+          </a:lnRef>
+          <a:fillRef idx="1">
+            <a:schemeClr val="accent1"/>
+          </a:fillRef>
+          <a:effectRef idx="0">
+            <a:schemeClr val="accent1"/>
+          </a:effectRef>
+          <a:fontRef idx="minor">
+            <a:schemeClr val="lt1"/>
+          </a:fontRef>
+        </p:style>
+        <p:txBody>
+          <a:bodyPr rtlCol="0" anchor="ctr"/>
+          <a:lstStyle/>
+          <a:p>
+            <a:pPr algn="ctr"/>
+            <a:endParaRPr lang="en-US" dirty="0"/>
+          </a:p>
+        </p:txBody>
+      </p:sp>
+      <p:sp>
+        <p:nvSpPr>
+          <p:cNvPr id="14" name="Rectangle 13">
+            <a:extLst>
+              <a:ext uri="{FF2B5EF4-FFF2-40B4-BE49-F238E27FC236}">
+                <a16:creationId xmlns:a16="http://schemas.microsoft.com/office/drawing/2014/main" id="{3C1F0EB8-D260-4FB6-ACF6-6E86B9A02919}"/>
+              </a:ext>
+              <a:ext uri="{C183D7F6-B498-43B3-948B-1728B52AA6E4}">
+                <adec:decorative xmlns:adec="http://schemas.microsoft.com/office/drawing/2017/decorative" val="1"/>
+              </a:ext>
+            </a:extLst>
+          </p:cNvPr>
+          <p:cNvSpPr/>
+          <p:nvPr/>
+        </p:nvSpPr>
+        <p:spPr>
+          <a:xfrm>
+            <a:off x="6834487" y="4223911"/>
+            <a:ext cx="5357513" cy="2634089"/>
+          </a:xfrm>
+          <a:prstGeom prst="rect">
+            <a:avLst/>
+          </a:prstGeom>
+          <a:solidFill>
+            <a:srgbClr val="2F3342"/>
+          </a:solidFill>
+          <a:ln>
+            <a:noFill/>
+          </a:ln>
+          <a:effectLst/>
+        </p:spPr>
+        <p:style>
+          <a:lnRef idx="2">
+            <a:schemeClr val="accent1">
+              <a:shade val="50000"/>
+            </a:schemeClr>
+          </a:lnRef>
+          <a:fillRef idx="1">
+            <a:schemeClr val="accent1"/>
+          </a:fillRef>
+          <a:effectRef idx="0">
+            <a:schemeClr val="accent1"/>
+          </a:effectRef>
+          <a:fontRef idx="minor">
+            <a:schemeClr val="lt1"/>
+          </a:fontRef>
+        </p:style>
+        <p:txBody>
+          <a:bodyPr rtlCol="0" anchor="ctr"/>
+          <a:lstStyle/>
+          <a:p>
+            <a:pPr algn="ctr"/>
+            <a:endParaRPr lang="en-US" dirty="0"/>
+          </a:p>
+        </p:txBody>
+      </p:sp>
+      <p:sp>
+        <p:nvSpPr>
+          <p:cNvPr id="15" name="Rectangle 14">
+            <a:extLst>
+              <a:ext uri="{FF2B5EF4-FFF2-40B4-BE49-F238E27FC236}">
+                <a16:creationId xmlns:a16="http://schemas.microsoft.com/office/drawing/2014/main" id="{76D4BFC2-69CA-4ED6-89E7-A9ADB571E7A4}"/>
+              </a:ext>
+            </a:extLst>
+          </p:cNvPr>
+          <p:cNvSpPr/>
+          <p:nvPr/>
+        </p:nvSpPr>
+        <p:spPr>
+          <a:xfrm>
+            <a:off x="7050026" y="4485342"/>
+            <a:ext cx="4423315" cy="1738307"/>
+          </a:xfrm>
+          <a:prstGeom prst="rect">
+            <a:avLst/>
+          </a:prstGeom>
+          <a:noFill/>
+          <a:ln>
+            <a:noFill/>
+          </a:ln>
+        </p:spPr>
+        <p:style>
+          <a:lnRef idx="2">
+            <a:schemeClr val="accent1">
+              <a:shade val="50000"/>
+            </a:schemeClr>
+          </a:lnRef>
+          <a:fillRef idx="1">
+            <a:schemeClr val="accent1"/>
+          </a:fillRef>
+          <a:effectRef idx="0">
+            <a:schemeClr val="accent1"/>
+          </a:effectRef>
+          <a:fontRef idx="minor">
+            <a:schemeClr val="lt1"/>
+          </a:fontRef>
+        </p:style>
+        <p:txBody>
+          <a:bodyPr lIns="274320" rIns="91440" rtlCol="0" anchor="ctr"/>
+          <a:lstStyle/>
+          <a:p>
+            <a:pPr>
+              <a:lnSpc>
+                <a:spcPct val="80000"/>
+              </a:lnSpc>
+              <a:defRPr sz="10000">
+                <a:solidFill>
+                  <a:srgbClr val="3A3B39"/>
+                </a:solidFill>
+                <a:latin typeface="Bebas"/>
+                <a:ea typeface="Bebas"/>
+                <a:cs typeface="Bebas"/>
+                <a:sym typeface="Bebas"/>
+              </a:defRPr>
+            </a:pPr>
+            <a:r>
+              <a:rPr lang="en-US" sz="3200" b="1" dirty="0">
+                <a:solidFill>
+                  <a:schemeClr val="bg1"/>
+                </a:solidFill>
+                <a:latin typeface="+mj-lt"/>
+                <a:cs typeface="Gill Sans" panose="020B0502020104020203" pitchFamily="34" charset="-79"/>
+              </a:rPr>
+              <a:t>YOUR TITLE GOES HERE</a:t>
+            </a:r>
+          </a:p>
+          <a:p>
+            <a:r>
+              <a:rPr lang="en-US" sz="1200" dirty="0">
+                <a:latin typeface="+mj-lt"/>
+              </a:rPr>
+              <a:t>Lorem ipsum dolor sit amet, consectetur adipiscing elit. </a:t>
+            </a:r>
+            <a:br>
+              <a:rPr lang="en-US" sz="1200" dirty="0">
+                <a:latin typeface="+mj-lt"/>
+              </a:rPr>
+            </a:br>
+            <a:r>
+              <a:rPr lang="en-US" sz="1200" dirty="0">
+                <a:latin typeface="+mj-lt"/>
+              </a:rPr>
+              <a:t>Ut gravida eros erat. Proin a tellus sed risus lobortis sagitti</a:t>
+            </a:r>
+          </a:p>
+        </p:txBody>
+      </p:sp>
+      <p:sp>
+        <p:nvSpPr>
+          <p:cNvPr id="2" name="Footer Placeholder 1">
+            <a:extLst>
+              <a:ext uri="{FF2B5EF4-FFF2-40B4-BE49-F238E27FC236}">
+                <a16:creationId xmlns:a16="http://schemas.microsoft.com/office/drawing/2014/main" id="{3D8BBA11-131E-446B-BC9B-D0A09B1AF059}"/>
+              </a:ext>
+            </a:extLst>
+          </p:cNvPr>
+          <p:cNvSpPr>
+            <a:spLocks noGrp="1"/>
+          </p:cNvSpPr>
+          <p:nvPr>
+            <p:ph type="ftr" sz="quarter" idx="11"/>
+          </p:nvPr>
+        </p:nvSpPr>
+        <p:spPr/>
+        <p:txBody>
+          <a:bodyPr/>
+          <a:lstStyle/>
+          <a:p>
+            <a:r>
+              <a:rPr lang="en-US" dirty="0"/>
+              <a:t>Add a Footer</a:t>
+            </a:r>
+          </a:p>
+        </p:txBody>
+      </p:sp>
+      <p:sp>
+        <p:nvSpPr>
+          <p:cNvPr id="9" name="Rectangle: Single Corner Snipped 8" descr="Footer accent box">
+            <a:extLst>
+              <a:ext uri="{FF2B5EF4-FFF2-40B4-BE49-F238E27FC236}">
+                <a16:creationId xmlns:a16="http://schemas.microsoft.com/office/drawing/2014/main" id="{DF712259-BEF9-4B45-8D68-5F74C49207DE}"/>
+              </a:ext>
+            </a:extLst>
+          </p:cNvPr>
+          <p:cNvSpPr/>
+          <p:nvPr/>
+        </p:nvSpPr>
+        <p:spPr>
+          <a:xfrm flipH="1">
+            <a:off x="11549269" y="6356350"/>
+            <a:ext cx="642731" cy="501650"/>
+          </a:xfrm>
+          <a:prstGeom prst="snip1Rect">
+            <a:avLst/>
+          </a:prstGeom>
+          <a:gradFill>
+            <a:gsLst>
+              <a:gs pos="0">
+                <a:srgbClr val="038B30">
+                  <a:alpha val="70000"/>
+                </a:srgbClr>
+              </a:gs>
+              <a:gs pos="50000">
+                <a:srgbClr val="05EE55">
+                  <a:alpha val="70000"/>
+                </a:srgbClr>
+              </a:gs>
+              <a:gs pos="100000">
+                <a:srgbClr val="C0F400">
+                  <a:alpha val="70000"/>
+                </a:srgbClr>
+              </a:gs>
+            </a:gsLst>
+            <a:lin ang="5400000" scaled="1"/>
+          </a:gradFill>
+          <a:ln>
+            <a:noFill/>
+          </a:ln>
+        </p:spPr>
+        <p:style>
+          <a:lnRef idx="2">
+            <a:schemeClr val="accent1">
+              <a:shade val="50000"/>
+            </a:schemeClr>
+          </a:lnRef>
+          <a:fillRef idx="1">
+            <a:schemeClr val="accent1"/>
+          </a:fillRef>
+          <a:effectRef idx="0">
+            <a:schemeClr val="accent1"/>
+          </a:effectRef>
+          <a:fontRef idx="minor">
+            <a:schemeClr val="lt1"/>
+          </a:fontRef>
+        </p:style>
+        <p:txBody>
+          <a:bodyPr rtlCol="0" anchor="ctr"/>
+          <a:lstStyle/>
+          <a:p>
+            <a:pPr algn="ctr"/>
+            <a:endParaRPr lang="en-US" dirty="0">
+              <a:solidFill>
+                <a:schemeClr val="bg1"/>
+              </a:solidFill>
+            </a:endParaRPr>
+          </a:p>
+        </p:txBody>
+      </p:sp>
+      <p:sp>
+        <p:nvSpPr>
+          <p:cNvPr id="3" name="Slide Number Placeholder 2">
+            <a:extLst>
+              <a:ext uri="{FF2B5EF4-FFF2-40B4-BE49-F238E27FC236}">
+                <a16:creationId xmlns:a16="http://schemas.microsoft.com/office/drawing/2014/main" id="{206B3DE3-5308-4ADE-BC26-29765480D1E1}"/>
+              </a:ext>
+            </a:extLst>
+          </p:cNvPr>
+          <p:cNvSpPr>
+            <a:spLocks noGrp="1"/>
+          </p:cNvSpPr>
+          <p:nvPr>
+            <p:ph type="sldNum" sz="quarter" idx="12"/>
+          </p:nvPr>
+        </p:nvSpPr>
+        <p:spPr/>
+        <p:txBody>
+          <a:bodyPr/>
+          <a:lstStyle/>
+          <a:p>
+            <a:fld id="{8C2E478F-E849-4A8C-AF1F-CBCC78A7CBFA}" type="slidenum">
+              <a:rPr lang="en-US" smtClean="0"/>
+              <a:pPr/>
+              <a:t>10</a:t>
+            </a:fld>
+            <a:endParaRPr lang="en-US" dirty="0"/>
+          </a:p>
+        </p:txBody>
+      </p:sp>
+    </p:spTree>
+    <p:extLst>
+      <p:ext uri="{BB962C8B-B14F-4D97-AF65-F5344CB8AC3E}">
+        <p14:creationId xmlns:p14="http://schemas.microsoft.com/office/powerpoint/2010/main" val="1389222877"/>
+      </p:ext>
+    </p:extLst>
+  </p:cSld>
+  <p:clrMapOvr>
+    <a:masterClrMapping/>
+  </p:clrMapOvr>
+</p:sld>
+</file>
+
+<file path=ppt/slides/slide11.xml><?xml version="1.0" encoding="utf-8"?>
 <p:sld xmlns:a="http://schemas.openxmlformats.org/drawingml/2006/main" xmlns:r="http://schemas.openxmlformats.org/officeDocument/2006/relationships" xmlns:p="http://schemas.openxmlformats.org/presentationml/2006/main">
   <p:cSld>
     <p:bg>
@@ -12228,7 +11605,7 @@
             <a:fld id="{8C2E478F-E849-4A8C-AF1F-CBCC78A7CBFA}" type="slidenum">
               <a:rPr lang="en-US" smtClean="0"/>
               <a:pPr/>
-              <a:t>10</a:t>
+              <a:t>11</a:t>
             </a:fld>
             <a:endParaRPr lang="en-US" dirty="0"/>
           </a:p>
@@ -12247,7 +11624,7 @@
 </p:sld>
 </file>
 
-<file path=ppt/slides/slide11.xml><?xml version="1.0" encoding="utf-8"?>
+<file path=ppt/slides/slide12.xml><?xml version="1.0" encoding="utf-8"?>
 <p:sld xmlns:a="http://schemas.openxmlformats.org/drawingml/2006/main" xmlns:r="http://schemas.openxmlformats.org/officeDocument/2006/relationships" xmlns:p="http://schemas.openxmlformats.org/presentationml/2006/main">
   <p:cSld>
     <p:spTree>
@@ -12288,7 +11665,7 @@
             <a:fld id="{8C2E478F-E849-4A8C-AF1F-CBCC78A7CBFA}" type="slidenum">
               <a:rPr lang="en-US" smtClean="0"/>
               <a:pPr/>
-              <a:t>11</a:t>
+              <a:t>12</a:t>
             </a:fld>
             <a:endParaRPr lang="en-US" dirty="0"/>
           </a:p>
@@ -13527,6 +12904,1723 @@
           <a:chExt cx="0" cy="0"/>
         </a:xfrm>
       </p:grpSpPr>
+      <p:pic>
+        <p:nvPicPr>
+          <p:cNvPr id="15" name="Content Placeholder 14" descr="Chart, histogram&#10;&#10;Description automatically generated">
+            <a:extLst>
+              <a:ext uri="{FF2B5EF4-FFF2-40B4-BE49-F238E27FC236}">
+                <a16:creationId xmlns:a16="http://schemas.microsoft.com/office/drawing/2014/main" id="{58F3AA10-F8AA-4A79-8369-93BB773A06D3}"/>
+              </a:ext>
+            </a:extLst>
+          </p:cNvPr>
+          <p:cNvPicPr>
+            <a:picLocks noGrp="1" noChangeAspect="1"/>
+          </p:cNvPicPr>
+          <p:nvPr>
+            <p:ph type="pic" sz="quarter" idx="15"/>
+          </p:nvPr>
+        </p:nvPicPr>
+        <p:blipFill rotWithShape="1">
+          <a:blip r:embed="rId2"/>
+          <a:srcRect t="-1" r="31322" b="-1"/>
+          <a:stretch/>
+        </p:blipFill>
+        <p:spPr>
+          <a:xfrm>
+            <a:off x="5390642" y="1739238"/>
+            <a:ext cx="6158627" cy="4147427"/>
+          </a:xfrm>
+          <a:noFill/>
+        </p:spPr>
+      </p:pic>
+      <p:sp>
+        <p:nvSpPr>
+          <p:cNvPr id="2" name="Title 1">
+            <a:extLst>
+              <a:ext uri="{FF2B5EF4-FFF2-40B4-BE49-F238E27FC236}">
+                <a16:creationId xmlns:a16="http://schemas.microsoft.com/office/drawing/2014/main" id="{C09ADB54-3897-4872-B9B3-1888BB60FDFF}"/>
+              </a:ext>
+            </a:extLst>
+          </p:cNvPr>
+          <p:cNvSpPr>
+            <a:spLocks noGrp="1"/>
+          </p:cNvSpPr>
+          <p:nvPr>
+            <p:ph type="title"/>
+          </p:nvPr>
+        </p:nvSpPr>
+        <p:spPr>
+          <a:xfrm>
+            <a:off x="5431498" y="675303"/>
+            <a:ext cx="6117771" cy="573989"/>
+          </a:xfrm>
+        </p:spPr>
+        <p:txBody>
+          <a:bodyPr anchor="ctr">
+            <a:normAutofit/>
+          </a:bodyPr>
+          <a:lstStyle/>
+          <a:p>
+            <a:r>
+              <a:rPr lang="en-US" dirty="0"/>
+              <a:t>Zero Vehicle Households (HHs)</a:t>
+            </a:r>
+          </a:p>
+        </p:txBody>
+      </p:sp>
+      <p:sp>
+        <p:nvSpPr>
+          <p:cNvPr id="4" name="Text Placeholder 3">
+            <a:extLst>
+              <a:ext uri="{FF2B5EF4-FFF2-40B4-BE49-F238E27FC236}">
+                <a16:creationId xmlns:a16="http://schemas.microsoft.com/office/drawing/2014/main" id="{46E2CC9E-302A-4500-B0E3-4BE84867E197}"/>
+              </a:ext>
+            </a:extLst>
+          </p:cNvPr>
+          <p:cNvSpPr>
+            <a:spLocks noGrp="1"/>
+          </p:cNvSpPr>
+          <p:nvPr>
+            <p:ph type="body" idx="13"/>
+          </p:nvPr>
+        </p:nvSpPr>
+        <p:spPr>
+          <a:xfrm>
+            <a:off x="5431498" y="1304187"/>
+            <a:ext cx="6076915" cy="407670"/>
+          </a:xfrm>
+        </p:spPr>
+        <p:txBody>
+          <a:bodyPr>
+            <a:normAutofit fontScale="70000" lnSpcReduction="20000"/>
+          </a:bodyPr>
+          <a:lstStyle/>
+          <a:p>
+            <a:r>
+              <a:rPr lang="en-US" dirty="0"/>
+              <a:t>Rural areas have significantly less 0 vehicle HHs compared to the nation</a:t>
+            </a:r>
+          </a:p>
+        </p:txBody>
+      </p:sp>
+      <p:sp>
+        <p:nvSpPr>
+          <p:cNvPr id="11" name="Footer Placeholder 10">
+            <a:extLst>
+              <a:ext uri="{FF2B5EF4-FFF2-40B4-BE49-F238E27FC236}">
+                <a16:creationId xmlns:a16="http://schemas.microsoft.com/office/drawing/2014/main" id="{27599ABA-671B-4E90-B4E8-5B2482234ACA}"/>
+              </a:ext>
+            </a:extLst>
+          </p:cNvPr>
+          <p:cNvSpPr>
+            <a:spLocks noGrp="1"/>
+          </p:cNvSpPr>
+          <p:nvPr>
+            <p:ph type="ftr" sz="quarter" idx="16"/>
+          </p:nvPr>
+        </p:nvSpPr>
+        <p:spPr>
+          <a:xfrm>
+            <a:off x="595884" y="6405747"/>
+            <a:ext cx="4537976" cy="427682"/>
+          </a:xfrm>
+        </p:spPr>
+        <p:txBody>
+          <a:bodyPr anchor="ctr">
+            <a:normAutofit fontScale="32500" lnSpcReduction="20000"/>
+          </a:bodyPr>
+          <a:lstStyle/>
+          <a:p>
+            <a:pPr>
+              <a:spcAft>
+                <a:spcPts val="600"/>
+              </a:spcAft>
+            </a:pPr>
+            <a:r>
+              <a:rPr lang="en-US" sz="3100" dirty="0">
+                <a:hlinkClick r:id="rId3"/>
+              </a:rPr>
+              <a:t>https://data.census.gov/cedsci/table?tid=ACSDP5Y2019.DP04&amp;hidePreview=true</a:t>
+            </a:r>
+            <a:endParaRPr lang="en-US" sz="3100" dirty="0"/>
+          </a:p>
+          <a:p>
+            <a:pPr>
+              <a:spcAft>
+                <a:spcPts val="600"/>
+              </a:spcAft>
+            </a:pPr>
+            <a:endParaRPr lang="en-US" dirty="0"/>
+          </a:p>
+        </p:txBody>
+      </p:sp>
+      <p:sp>
+        <p:nvSpPr>
+          <p:cNvPr id="12" name="Slide Number Placeholder 11">
+            <a:extLst>
+              <a:ext uri="{FF2B5EF4-FFF2-40B4-BE49-F238E27FC236}">
+                <a16:creationId xmlns:a16="http://schemas.microsoft.com/office/drawing/2014/main" id="{A40D7403-0D24-42D0-9DE5-23601D8FBC17}"/>
+              </a:ext>
+            </a:extLst>
+          </p:cNvPr>
+          <p:cNvSpPr>
+            <a:spLocks noGrp="1"/>
+          </p:cNvSpPr>
+          <p:nvPr>
+            <p:ph type="sldNum" sz="quarter" idx="17"/>
+          </p:nvPr>
+        </p:nvSpPr>
+        <p:spPr>
+          <a:xfrm>
+            <a:off x="11549269" y="6405746"/>
+            <a:ext cx="642731" cy="407804"/>
+          </a:xfrm>
+        </p:spPr>
+        <p:txBody>
+          <a:bodyPr anchor="ctr">
+            <a:normAutofit/>
+          </a:bodyPr>
+          <a:lstStyle/>
+          <a:p>
+            <a:pPr>
+              <a:spcAft>
+                <a:spcPts val="600"/>
+              </a:spcAft>
+            </a:pPr>
+            <a:fld id="{8C2E478F-E849-4A8C-AF1F-CBCC78A7CBFA}" type="slidenum">
+              <a:rPr lang="en-US" smtClean="0"/>
+              <a:pPr>
+                <a:spcAft>
+                  <a:spcPts val="600"/>
+                </a:spcAft>
+              </a:pPr>
+              <a:t>4</a:t>
+            </a:fld>
+            <a:endParaRPr lang="en-US"/>
+          </a:p>
+        </p:txBody>
+      </p:sp>
+      <p:sp>
+        <p:nvSpPr>
+          <p:cNvPr id="36" name="Rectangle 35">
+            <a:extLst>
+              <a:ext uri="{FF2B5EF4-FFF2-40B4-BE49-F238E27FC236}">
+                <a16:creationId xmlns:a16="http://schemas.microsoft.com/office/drawing/2014/main" id="{9C123A60-91D2-4553-8DA0-CDCCC6BAE5B0}"/>
+              </a:ext>
+            </a:extLst>
+          </p:cNvPr>
+          <p:cNvSpPr/>
+          <p:nvPr/>
+        </p:nvSpPr>
+        <p:spPr>
+          <a:xfrm>
+            <a:off x="275422" y="1811587"/>
+            <a:ext cx="3547431" cy="2554545"/>
+          </a:xfrm>
+          <a:prstGeom prst="rect">
+            <a:avLst/>
+          </a:prstGeom>
+          <a:noFill/>
+          <a:ln w="57150">
+            <a:solidFill>
+              <a:schemeClr val="accent2">
+                <a:lumMod val="75000"/>
+              </a:schemeClr>
+            </a:solidFill>
+          </a:ln>
+        </p:spPr>
+        <p:txBody>
+          <a:bodyPr wrap="square" lIns="91440" tIns="45720" rIns="91440" bIns="45720">
+            <a:spAutoFit/>
+            <a:scene3d>
+              <a:camera prst="orthographicFront"/>
+              <a:lightRig rig="harsh" dir="t"/>
+            </a:scene3d>
+            <a:sp3d prstMaterial="matte">
+              <a:contourClr>
+                <a:schemeClr val="bg1">
+                  <a:lumMod val="65000"/>
+                </a:schemeClr>
+              </a:contourClr>
+            </a:sp3d>
+          </a:bodyPr>
+          <a:lstStyle/>
+          <a:p>
+            <a:pPr algn="ctr"/>
+            <a:r>
+              <a:rPr lang="en-US" sz="4000" dirty="0">
+                <a:ln w="0"/>
+                <a:solidFill>
+                  <a:schemeClr val="bg1"/>
+                </a:solidFill>
+                <a:effectLst/>
+              </a:rPr>
+              <a:t>U.S.A.</a:t>
+            </a:r>
+          </a:p>
+          <a:p>
+            <a:pPr algn="ctr"/>
+            <a:r>
+              <a:rPr lang="en-US" sz="4000" dirty="0">
+                <a:ln w="0"/>
+                <a:solidFill>
+                  <a:schemeClr val="bg1"/>
+                </a:solidFill>
+                <a:effectLst/>
+              </a:rPr>
+              <a:t>Zero Vehicle Households:</a:t>
+            </a:r>
+          </a:p>
+          <a:p>
+            <a:pPr algn="ctr"/>
+            <a:r>
+              <a:rPr lang="en-US" sz="4000" dirty="0">
+                <a:ln w="0"/>
+                <a:solidFill>
+                  <a:schemeClr val="bg1"/>
+                </a:solidFill>
+                <a:effectLst/>
+              </a:rPr>
+              <a:t>8.6 %</a:t>
+            </a:r>
+          </a:p>
+        </p:txBody>
+      </p:sp>
+      <p:cxnSp>
+        <p:nvCxnSpPr>
+          <p:cNvPr id="38" name="Straight Connector 37">
+            <a:extLst>
+              <a:ext uri="{FF2B5EF4-FFF2-40B4-BE49-F238E27FC236}">
+                <a16:creationId xmlns:a16="http://schemas.microsoft.com/office/drawing/2014/main" id="{CD0A64F7-281C-48F2-B178-F7A5A108CC5E}"/>
+              </a:ext>
+            </a:extLst>
+          </p:cNvPr>
+          <p:cNvCxnSpPr>
+            <a:cxnSpLocks/>
+          </p:cNvCxnSpPr>
+          <p:nvPr/>
+        </p:nvCxnSpPr>
+        <p:spPr>
+          <a:xfrm flipV="1">
+            <a:off x="8510875" y="1734275"/>
+            <a:ext cx="0" cy="4152390"/>
+          </a:xfrm>
+          <a:prstGeom prst="line">
+            <a:avLst/>
+          </a:prstGeom>
+          <a:ln w="31750" cmpd="sng">
+            <a:solidFill>
+              <a:schemeClr val="accent2"/>
+            </a:solidFill>
+          </a:ln>
+        </p:spPr>
+        <p:style>
+          <a:lnRef idx="3">
+            <a:schemeClr val="accent3"/>
+          </a:lnRef>
+          <a:fillRef idx="0">
+            <a:schemeClr val="accent3"/>
+          </a:fillRef>
+          <a:effectRef idx="2">
+            <a:schemeClr val="accent3"/>
+          </a:effectRef>
+          <a:fontRef idx="minor">
+            <a:schemeClr val="tx1"/>
+          </a:fontRef>
+        </p:style>
+      </p:cxnSp>
+    </p:spTree>
+    <p:extLst>
+      <p:ext uri="{BB962C8B-B14F-4D97-AF65-F5344CB8AC3E}">
+        <p14:creationId xmlns:p14="http://schemas.microsoft.com/office/powerpoint/2010/main" val="1507751133"/>
+      </p:ext>
+    </p:extLst>
+  </p:cSld>
+  <p:clrMapOvr>
+    <a:masterClrMapping/>
+  </p:clrMapOvr>
+  <p:timing>
+    <p:tnLst>
+      <p:par>
+        <p:cTn id="1" dur="indefinite" restart="never" nodeType="tmRoot">
+          <p:childTnLst>
+            <p:seq concurrent="1" nextAc="seek">
+              <p:cTn id="2" dur="indefinite" nodeType="mainSeq">
+                <p:childTnLst>
+                  <p:par>
+                    <p:cTn id="3" fill="hold">
+                      <p:stCondLst>
+                        <p:cond delay="indefinite"/>
+                      </p:stCondLst>
+                      <p:childTnLst>
+                        <p:par>
+                          <p:cTn id="4" fill="hold">
+                            <p:stCondLst>
+                              <p:cond delay="0"/>
+                            </p:stCondLst>
+                            <p:childTnLst>
+                              <p:par>
+                                <p:cTn id="5" presetID="1" presetClass="entr" presetSubtype="0" fill="hold" nodeType="clickEffect">
+                                  <p:stCondLst>
+                                    <p:cond delay="0"/>
+                                  </p:stCondLst>
+                                  <p:childTnLst>
+                                    <p:set>
+                                      <p:cBhvr>
+                                        <p:cTn id="6" dur="1" fill="hold">
+                                          <p:stCondLst>
+                                            <p:cond delay="0"/>
+                                          </p:stCondLst>
+                                        </p:cTn>
+                                        <p:tgtEl>
+                                          <p:spTgt spid="38"/>
+                                        </p:tgtEl>
+                                        <p:attrNameLst>
+                                          <p:attrName>style.visibility</p:attrName>
+                                        </p:attrNameLst>
+                                      </p:cBhvr>
+                                      <p:to>
+                                        <p:strVal val="visible"/>
+                                      </p:to>
+                                    </p:set>
+                                  </p:childTnLst>
+                                </p:cTn>
+                              </p:par>
+                              <p:par>
+                                <p:cTn id="7" presetID="1" presetClass="entr" presetSubtype="0" fill="hold" grpId="0" nodeType="withEffect">
+                                  <p:stCondLst>
+                                    <p:cond delay="0"/>
+                                  </p:stCondLst>
+                                  <p:childTnLst>
+                                    <p:set>
+                                      <p:cBhvr>
+                                        <p:cTn id="8" dur="1" fill="hold">
+                                          <p:stCondLst>
+                                            <p:cond delay="0"/>
+                                          </p:stCondLst>
+                                        </p:cTn>
+                                        <p:tgtEl>
+                                          <p:spTgt spid="36"/>
+                                        </p:tgtEl>
+                                        <p:attrNameLst>
+                                          <p:attrName>style.visibility</p:attrName>
+                                        </p:attrNameLst>
+                                      </p:cBhvr>
+                                      <p:to>
+                                        <p:strVal val="visible"/>
+                                      </p:to>
+                                    </p:set>
+                                  </p:childTnLst>
+                                </p:cTn>
+                              </p:par>
+                              <p:par>
+                                <p:cTn id="9" presetID="1" presetClass="entr" presetSubtype="0" fill="hold" grpId="0" nodeType="withEffect">
+                                  <p:stCondLst>
+                                    <p:cond delay="0"/>
+                                  </p:stCondLst>
+                                  <p:childTnLst>
+                                    <p:set>
+                                      <p:cBhvr>
+                                        <p:cTn id="10" dur="1" fill="hold">
+                                          <p:stCondLst>
+                                            <p:cond delay="0"/>
+                                          </p:stCondLst>
+                                        </p:cTn>
+                                        <p:tgtEl>
+                                          <p:spTgt spid="4">
+                                            <p:txEl>
+                                              <p:pRg st="0" end="0"/>
+                                            </p:txEl>
+                                          </p:spTgt>
+                                        </p:tgtEl>
+                                        <p:attrNameLst>
+                                          <p:attrName>style.visibility</p:attrName>
+                                        </p:attrNameLst>
+                                      </p:cBhvr>
+                                      <p:to>
+                                        <p:strVal val="visible"/>
+                                      </p:to>
+                                    </p:set>
+                                  </p:childTnLst>
+                                </p:cTn>
+                              </p:par>
+                            </p:childTnLst>
+                          </p:cTn>
+                        </p:par>
+                      </p:childTnLst>
+                    </p:cTn>
+                  </p:par>
+                </p:childTnLst>
+              </p:cTn>
+              <p:prevCondLst>
+                <p:cond evt="onPrev" delay="0">
+                  <p:tgtEl>
+                    <p:sldTgt/>
+                  </p:tgtEl>
+                </p:cond>
+              </p:prevCondLst>
+              <p:nextCondLst>
+                <p:cond evt="onNext" delay="0">
+                  <p:tgtEl>
+                    <p:sldTgt/>
+                  </p:tgtEl>
+                </p:cond>
+              </p:nextCondLst>
+            </p:seq>
+          </p:childTnLst>
+        </p:cTn>
+      </p:par>
+    </p:tnLst>
+    <p:bldLst>
+      <p:bldP spid="4" grpId="0" build="p"/>
+      <p:bldP spid="36" grpId="0" animBg="1"/>
+    </p:bldLst>
+  </p:timing>
+</p:sld>
+</file>
+
+<file path=ppt/slides/slide5.xml><?xml version="1.0" encoding="utf-8"?>
+<p:sld xmlns:a="http://schemas.openxmlformats.org/drawingml/2006/main" xmlns:r="http://schemas.openxmlformats.org/officeDocument/2006/relationships" xmlns:p="http://schemas.openxmlformats.org/presentationml/2006/main">
+  <p:cSld>
+    <p:spTree>
+      <p:nvGrpSpPr>
+        <p:cNvPr id="1" name=""/>
+        <p:cNvGrpSpPr/>
+        <p:nvPr/>
+      </p:nvGrpSpPr>
+      <p:grpSpPr>
+        <a:xfrm>
+          <a:off x="0" y="0"/>
+          <a:ext cx="0" cy="0"/>
+          <a:chOff x="0" y="0"/>
+          <a:chExt cx="0" cy="0"/>
+        </a:xfrm>
+      </p:grpSpPr>
+      <p:pic>
+        <p:nvPicPr>
+          <p:cNvPr id="8" name="Picture Placeholder 7" descr="Chart, box and whisker chart&#10;&#10;Description automatically generated">
+            <a:extLst>
+              <a:ext uri="{FF2B5EF4-FFF2-40B4-BE49-F238E27FC236}">
+                <a16:creationId xmlns:a16="http://schemas.microsoft.com/office/drawing/2014/main" id="{FE701098-85F1-4C35-909E-BAB76C8A2E63}"/>
+              </a:ext>
+            </a:extLst>
+          </p:cNvPr>
+          <p:cNvPicPr>
+            <a:picLocks noGrp="1" noChangeAspect="1"/>
+          </p:cNvPicPr>
+          <p:nvPr>
+            <p:ph idx="1"/>
+          </p:nvPr>
+        </p:nvPicPr>
+        <p:blipFill rotWithShape="1">
+          <a:blip r:embed="rId2"/>
+          <a:stretch/>
+        </p:blipFill>
+        <p:spPr>
+          <a:xfrm>
+            <a:off x="2317269" y="1189038"/>
+            <a:ext cx="7557462" cy="4987925"/>
+          </a:xfrm>
+          <a:noFill/>
+        </p:spPr>
+      </p:pic>
+      <p:sp>
+        <p:nvSpPr>
+          <p:cNvPr id="12" name="Speech Bubble: Rectangle with Corners Rounded 11">
+            <a:extLst>
+              <a:ext uri="{FF2B5EF4-FFF2-40B4-BE49-F238E27FC236}">
+                <a16:creationId xmlns:a16="http://schemas.microsoft.com/office/drawing/2014/main" id="{666C9523-E527-4CBC-A2DD-60EC056BD917}"/>
+              </a:ext>
+            </a:extLst>
+          </p:cNvPr>
+          <p:cNvSpPr/>
+          <p:nvPr/>
+        </p:nvSpPr>
+        <p:spPr>
+          <a:xfrm>
+            <a:off x="9346020" y="4328205"/>
+            <a:ext cx="2434854" cy="615553"/>
+          </a:xfrm>
+          <a:prstGeom prst="wedgeRoundRectCallout">
+            <a:avLst>
+              <a:gd name="adj1" fmla="val -37621"/>
+              <a:gd name="adj2" fmla="val 70177"/>
+              <a:gd name="adj3" fmla="val 16667"/>
+            </a:avLst>
+          </a:prstGeom>
+          <a:solidFill>
+            <a:schemeClr val="accent2"/>
+          </a:solidFill>
+          <a:ln>
+            <a:solidFill>
+              <a:schemeClr val="accent2"/>
+            </a:solidFill>
+          </a:ln>
+        </p:spPr>
+        <p:style>
+          <a:lnRef idx="2">
+            <a:schemeClr val="accent1">
+              <a:shade val="50000"/>
+            </a:schemeClr>
+          </a:lnRef>
+          <a:fillRef idx="1">
+            <a:schemeClr val="accent1"/>
+          </a:fillRef>
+          <a:effectRef idx="0">
+            <a:schemeClr val="accent1"/>
+          </a:effectRef>
+          <a:fontRef idx="minor">
+            <a:schemeClr val="lt1"/>
+          </a:fontRef>
+        </p:style>
+        <p:txBody>
+          <a:bodyPr rtlCol="0" anchor="ctr"/>
+          <a:lstStyle/>
+          <a:p>
+            <a:pPr algn="ctr"/>
+            <a:endParaRPr lang="en-US"/>
+          </a:p>
+        </p:txBody>
+      </p:sp>
+      <p:sp>
+        <p:nvSpPr>
+          <p:cNvPr id="20" name="Title 2">
+            <a:extLst>
+              <a:ext uri="{FF2B5EF4-FFF2-40B4-BE49-F238E27FC236}">
+                <a16:creationId xmlns:a16="http://schemas.microsoft.com/office/drawing/2014/main" id="{0E5388AF-4ED6-442F-BDC0-B2D4D4062E91}"/>
+              </a:ext>
+            </a:extLst>
+          </p:cNvPr>
+          <p:cNvSpPr>
+            <a:spLocks noGrp="1"/>
+          </p:cNvSpPr>
+          <p:nvPr>
+            <p:ph type="title"/>
+          </p:nvPr>
+        </p:nvSpPr>
+        <p:spPr>
+          <a:xfrm>
+            <a:off x="594519" y="0"/>
+            <a:ext cx="11002962" cy="1189038"/>
+          </a:xfrm>
+        </p:spPr>
+        <p:txBody>
+          <a:bodyPr anchor="ctr">
+            <a:normAutofit/>
+          </a:bodyPr>
+          <a:lstStyle/>
+          <a:p>
+            <a:r>
+              <a:rPr lang="en-US" sz="4000" dirty="0"/>
+              <a:t>Rural areas: Seniors, poverty, and unemployment</a:t>
+            </a:r>
+          </a:p>
+        </p:txBody>
+      </p:sp>
+      <p:sp>
+        <p:nvSpPr>
+          <p:cNvPr id="5" name="Footer Placeholder 4">
+            <a:extLst>
+              <a:ext uri="{FF2B5EF4-FFF2-40B4-BE49-F238E27FC236}">
+                <a16:creationId xmlns:a16="http://schemas.microsoft.com/office/drawing/2014/main" id="{2D788E78-202D-4552-BA6E-9869C925140D}"/>
+              </a:ext>
+            </a:extLst>
+          </p:cNvPr>
+          <p:cNvSpPr>
+            <a:spLocks noGrp="1"/>
+          </p:cNvSpPr>
+          <p:nvPr>
+            <p:ph type="ftr" sz="quarter" idx="10"/>
+          </p:nvPr>
+        </p:nvSpPr>
+        <p:spPr>
+          <a:xfrm>
+            <a:off x="595884" y="6468303"/>
+            <a:ext cx="4114800" cy="365125"/>
+          </a:xfrm>
+        </p:spPr>
+        <p:txBody>
+          <a:bodyPr anchor="ctr">
+            <a:normAutofit/>
+          </a:bodyPr>
+          <a:lstStyle/>
+          <a:p>
+            <a:pPr>
+              <a:spcAft>
+                <a:spcPts val="600"/>
+              </a:spcAft>
+            </a:pPr>
+            <a:r>
+              <a:rPr lang="en-US"/>
+              <a:t>Add a Footer</a:t>
+            </a:r>
+          </a:p>
+        </p:txBody>
+      </p:sp>
+      <p:sp>
+        <p:nvSpPr>
+          <p:cNvPr id="6" name="Slide Number Placeholder 5">
+            <a:extLst>
+              <a:ext uri="{FF2B5EF4-FFF2-40B4-BE49-F238E27FC236}">
+                <a16:creationId xmlns:a16="http://schemas.microsoft.com/office/drawing/2014/main" id="{EDFB4D4B-8524-4562-89A3-D53A9ED91368}"/>
+              </a:ext>
+            </a:extLst>
+          </p:cNvPr>
+          <p:cNvSpPr>
+            <a:spLocks noGrp="1"/>
+          </p:cNvSpPr>
+          <p:nvPr>
+            <p:ph type="sldNum" sz="quarter" idx="11"/>
+          </p:nvPr>
+        </p:nvSpPr>
+        <p:spPr>
+          <a:xfrm>
+            <a:off x="11549269" y="6405746"/>
+            <a:ext cx="642731" cy="407804"/>
+          </a:xfrm>
+        </p:spPr>
+        <p:txBody>
+          <a:bodyPr anchor="ctr">
+            <a:normAutofit/>
+          </a:bodyPr>
+          <a:lstStyle/>
+          <a:p>
+            <a:pPr>
+              <a:spcAft>
+                <a:spcPts val="600"/>
+              </a:spcAft>
+            </a:pPr>
+            <a:fld id="{8C2E478F-E849-4A8C-AF1F-CBCC78A7CBFA}" type="slidenum">
+              <a:rPr lang="en-US" smtClean="0"/>
+              <a:pPr>
+                <a:spcAft>
+                  <a:spcPts val="600"/>
+                </a:spcAft>
+              </a:pPr>
+              <a:t>5</a:t>
+            </a:fld>
+            <a:endParaRPr lang="en-US"/>
+          </a:p>
+        </p:txBody>
+      </p:sp>
+      <p:sp>
+        <p:nvSpPr>
+          <p:cNvPr id="11" name="Rectangle 10">
+            <a:extLst>
+              <a:ext uri="{FF2B5EF4-FFF2-40B4-BE49-F238E27FC236}">
+                <a16:creationId xmlns:a16="http://schemas.microsoft.com/office/drawing/2014/main" id="{4D789DC8-7412-466F-9C2B-2628861D067D}"/>
+              </a:ext>
+            </a:extLst>
+          </p:cNvPr>
+          <p:cNvSpPr/>
+          <p:nvPr/>
+        </p:nvSpPr>
+        <p:spPr>
+          <a:xfrm>
+            <a:off x="9208951" y="4349104"/>
+            <a:ext cx="2690036" cy="584775"/>
+          </a:xfrm>
+          <a:prstGeom prst="rect">
+            <a:avLst/>
+          </a:prstGeom>
+          <a:noFill/>
+        </p:spPr>
+        <p:txBody>
+          <a:bodyPr wrap="square" lIns="91440" tIns="45720" rIns="91440" bIns="45720">
+            <a:spAutoFit/>
+          </a:bodyPr>
+          <a:lstStyle/>
+          <a:p>
+            <a:pPr algn="ctr"/>
+            <a:r>
+              <a:rPr lang="en-US" sz="1600" b="1" cap="none" spc="0" dirty="0">
+                <a:ln w="9525">
+                  <a:noFill/>
+                  <a:prstDash val="solid"/>
+                </a:ln>
+                <a:solidFill>
+                  <a:schemeClr val="tx2"/>
+                </a:solidFill>
+              </a:rPr>
+              <a:t>U.S. Unemployment: 3.4 %</a:t>
+            </a:r>
+          </a:p>
+          <a:p>
+            <a:pPr algn="ctr"/>
+            <a:r>
+              <a:rPr lang="en-US" sz="1600" b="1" dirty="0">
+                <a:ln w="9525">
+                  <a:noFill/>
+                  <a:prstDash val="solid"/>
+                </a:ln>
+                <a:solidFill>
+                  <a:schemeClr val="tx2"/>
+                </a:solidFill>
+              </a:rPr>
+              <a:t>Rural Unemployment: 5.0 %</a:t>
+            </a:r>
+            <a:endParaRPr lang="en-US" sz="1600" b="1" cap="none" spc="0" dirty="0">
+              <a:ln w="9525">
+                <a:noFill/>
+                <a:prstDash val="solid"/>
+              </a:ln>
+              <a:solidFill>
+                <a:schemeClr val="tx2"/>
+              </a:solidFill>
+            </a:endParaRPr>
+          </a:p>
+        </p:txBody>
+      </p:sp>
+      <p:sp>
+        <p:nvSpPr>
+          <p:cNvPr id="21" name="Speech Bubble: Rectangle with Corners Rounded 20">
+            <a:extLst>
+              <a:ext uri="{FF2B5EF4-FFF2-40B4-BE49-F238E27FC236}">
+                <a16:creationId xmlns:a16="http://schemas.microsoft.com/office/drawing/2014/main" id="{BB6B29B5-D689-46F9-A227-32A858880B44}"/>
+              </a:ext>
+            </a:extLst>
+          </p:cNvPr>
+          <p:cNvSpPr/>
+          <p:nvPr/>
+        </p:nvSpPr>
+        <p:spPr>
+          <a:xfrm>
+            <a:off x="6096000" y="2673070"/>
+            <a:ext cx="2328530" cy="615553"/>
+          </a:xfrm>
+          <a:prstGeom prst="wedgeRoundRectCallout">
+            <a:avLst>
+              <a:gd name="adj1" fmla="val -37621"/>
+              <a:gd name="adj2" fmla="val 70177"/>
+              <a:gd name="adj3" fmla="val 16667"/>
+            </a:avLst>
+          </a:prstGeom>
+          <a:solidFill>
+            <a:schemeClr val="accent2"/>
+          </a:solidFill>
+          <a:ln>
+            <a:solidFill>
+              <a:schemeClr val="accent2"/>
+            </a:solidFill>
+          </a:ln>
+        </p:spPr>
+        <p:style>
+          <a:lnRef idx="2">
+            <a:schemeClr val="accent1">
+              <a:shade val="50000"/>
+            </a:schemeClr>
+          </a:lnRef>
+          <a:fillRef idx="1">
+            <a:schemeClr val="accent1"/>
+          </a:fillRef>
+          <a:effectRef idx="0">
+            <a:schemeClr val="accent1"/>
+          </a:effectRef>
+          <a:fontRef idx="minor">
+            <a:schemeClr val="lt1"/>
+          </a:fontRef>
+        </p:style>
+        <p:txBody>
+          <a:bodyPr rtlCol="0" anchor="ctr"/>
+          <a:lstStyle/>
+          <a:p>
+            <a:pPr algn="ctr"/>
+            <a:endParaRPr lang="en-US"/>
+          </a:p>
+        </p:txBody>
+      </p:sp>
+      <p:sp>
+        <p:nvSpPr>
+          <p:cNvPr id="23" name="Rectangle 22">
+            <a:extLst>
+              <a:ext uri="{FF2B5EF4-FFF2-40B4-BE49-F238E27FC236}">
+                <a16:creationId xmlns:a16="http://schemas.microsoft.com/office/drawing/2014/main" id="{ABC54E22-438D-49E8-BFE8-DED965DEF20F}"/>
+              </a:ext>
+            </a:extLst>
+          </p:cNvPr>
+          <p:cNvSpPr/>
+          <p:nvPr/>
+        </p:nvSpPr>
+        <p:spPr>
+          <a:xfrm>
+            <a:off x="5915247" y="2673070"/>
+            <a:ext cx="2690036" cy="584775"/>
+          </a:xfrm>
+          <a:prstGeom prst="rect">
+            <a:avLst/>
+          </a:prstGeom>
+          <a:noFill/>
+        </p:spPr>
+        <p:txBody>
+          <a:bodyPr wrap="square" lIns="91440" tIns="45720" rIns="91440" bIns="45720">
+            <a:spAutoFit/>
+          </a:bodyPr>
+          <a:lstStyle/>
+          <a:p>
+            <a:pPr algn="ctr"/>
+            <a:r>
+              <a:rPr lang="en-US" sz="1600" b="1" cap="none" spc="0" dirty="0">
+                <a:ln w="9525">
+                  <a:noFill/>
+                  <a:prstDash val="solid"/>
+                </a:ln>
+                <a:solidFill>
+                  <a:schemeClr val="tx2"/>
+                </a:solidFill>
+              </a:rPr>
+              <a:t>U.S. Poverty: 11.8 %</a:t>
+            </a:r>
+          </a:p>
+          <a:p>
+            <a:pPr algn="ctr"/>
+            <a:r>
+              <a:rPr lang="en-US" sz="1600" b="1" dirty="0">
+                <a:ln w="9525">
+                  <a:noFill/>
+                  <a:prstDash val="solid"/>
+                </a:ln>
+                <a:solidFill>
+                  <a:schemeClr val="tx2"/>
+                </a:solidFill>
+              </a:rPr>
+              <a:t>Rural Poverty: 12.5 %</a:t>
+            </a:r>
+            <a:endParaRPr lang="en-US" sz="1600" b="1" cap="none" spc="0" dirty="0">
+              <a:ln w="9525">
+                <a:noFill/>
+                <a:prstDash val="solid"/>
+              </a:ln>
+              <a:solidFill>
+                <a:schemeClr val="tx2"/>
+              </a:solidFill>
+            </a:endParaRPr>
+          </a:p>
+        </p:txBody>
+      </p:sp>
+      <p:sp>
+        <p:nvSpPr>
+          <p:cNvPr id="25" name="Speech Bubble: Rectangle with Corners Rounded 24">
+            <a:extLst>
+              <a:ext uri="{FF2B5EF4-FFF2-40B4-BE49-F238E27FC236}">
+                <a16:creationId xmlns:a16="http://schemas.microsoft.com/office/drawing/2014/main" id="{1943BC7A-4AAD-4C07-84AB-238CB041B97A}"/>
+              </a:ext>
+            </a:extLst>
+          </p:cNvPr>
+          <p:cNvSpPr/>
+          <p:nvPr/>
+        </p:nvSpPr>
+        <p:spPr>
+          <a:xfrm>
+            <a:off x="3198353" y="1845741"/>
+            <a:ext cx="2328530" cy="615553"/>
+          </a:xfrm>
+          <a:prstGeom prst="wedgeRoundRectCallout">
+            <a:avLst>
+              <a:gd name="adj1" fmla="val -14332"/>
+              <a:gd name="adj2" fmla="val 116815"/>
+              <a:gd name="adj3" fmla="val 16667"/>
+            </a:avLst>
+          </a:prstGeom>
+          <a:solidFill>
+            <a:schemeClr val="accent2"/>
+          </a:solidFill>
+          <a:ln>
+            <a:solidFill>
+              <a:schemeClr val="accent2"/>
+            </a:solidFill>
+          </a:ln>
+        </p:spPr>
+        <p:style>
+          <a:lnRef idx="2">
+            <a:schemeClr val="accent1">
+              <a:shade val="50000"/>
+            </a:schemeClr>
+          </a:lnRef>
+          <a:fillRef idx="1">
+            <a:schemeClr val="accent1"/>
+          </a:fillRef>
+          <a:effectRef idx="0">
+            <a:schemeClr val="accent1"/>
+          </a:effectRef>
+          <a:fontRef idx="minor">
+            <a:schemeClr val="lt1"/>
+          </a:fontRef>
+        </p:style>
+        <p:txBody>
+          <a:bodyPr rtlCol="0" anchor="ctr"/>
+          <a:lstStyle/>
+          <a:p>
+            <a:pPr algn="ctr"/>
+            <a:endParaRPr lang="en-US"/>
+          </a:p>
+        </p:txBody>
+      </p:sp>
+      <p:sp>
+        <p:nvSpPr>
+          <p:cNvPr id="28" name="Rectangle 27">
+            <a:extLst>
+              <a:ext uri="{FF2B5EF4-FFF2-40B4-BE49-F238E27FC236}">
+                <a16:creationId xmlns:a16="http://schemas.microsoft.com/office/drawing/2014/main" id="{B42A1118-2202-45C1-80DD-96CAC14C7662}"/>
+              </a:ext>
+            </a:extLst>
+          </p:cNvPr>
+          <p:cNvSpPr/>
+          <p:nvPr/>
+        </p:nvSpPr>
+        <p:spPr>
+          <a:xfrm>
+            <a:off x="3017600" y="1845741"/>
+            <a:ext cx="2690036" cy="584775"/>
+          </a:xfrm>
+          <a:prstGeom prst="rect">
+            <a:avLst/>
+          </a:prstGeom>
+          <a:noFill/>
+        </p:spPr>
+        <p:txBody>
+          <a:bodyPr wrap="square" lIns="91440" tIns="45720" rIns="91440" bIns="45720">
+            <a:spAutoFit/>
+          </a:bodyPr>
+          <a:lstStyle/>
+          <a:p>
+            <a:pPr algn="ctr"/>
+            <a:r>
+              <a:rPr lang="en-US" sz="1600" b="1" cap="none" spc="0" dirty="0">
+                <a:ln w="9525">
+                  <a:noFill/>
+                  <a:prstDash val="solid"/>
+                </a:ln>
+                <a:solidFill>
+                  <a:schemeClr val="tx2"/>
+                </a:solidFill>
+              </a:rPr>
+              <a:t>U.S. Seniors: 16.0 %</a:t>
+            </a:r>
+          </a:p>
+          <a:p>
+            <a:pPr algn="ctr"/>
+            <a:r>
+              <a:rPr lang="en-US" sz="1600" b="1" dirty="0">
+                <a:ln w="9525">
+                  <a:noFill/>
+                  <a:prstDash val="solid"/>
+                </a:ln>
+                <a:solidFill>
+                  <a:schemeClr val="tx2"/>
+                </a:solidFill>
+              </a:rPr>
+              <a:t>Rural Seniors: 18.4 %</a:t>
+            </a:r>
+            <a:endParaRPr lang="en-US" sz="1600" b="1" cap="none" spc="0" dirty="0">
+              <a:ln w="9525">
+                <a:noFill/>
+                <a:prstDash val="solid"/>
+              </a:ln>
+              <a:solidFill>
+                <a:schemeClr val="tx2"/>
+              </a:solidFill>
+            </a:endParaRPr>
+          </a:p>
+        </p:txBody>
+      </p:sp>
+    </p:spTree>
+    <p:extLst>
+      <p:ext uri="{BB962C8B-B14F-4D97-AF65-F5344CB8AC3E}">
+        <p14:creationId xmlns:p14="http://schemas.microsoft.com/office/powerpoint/2010/main" val="3188554115"/>
+      </p:ext>
+    </p:extLst>
+  </p:cSld>
+  <p:clrMapOvr>
+    <a:masterClrMapping/>
+  </p:clrMapOvr>
+  <p:timing>
+    <p:tnLst>
+      <p:par>
+        <p:cTn id="1" dur="indefinite" restart="never" nodeType="tmRoot">
+          <p:childTnLst>
+            <p:seq concurrent="1" nextAc="seek">
+              <p:cTn id="2" dur="indefinite" nodeType="mainSeq">
+                <p:childTnLst>
+                  <p:par>
+                    <p:cTn id="3" fill="hold">
+                      <p:stCondLst>
+                        <p:cond delay="indefinite"/>
+                      </p:stCondLst>
+                      <p:childTnLst>
+                        <p:par>
+                          <p:cTn id="4" fill="hold">
+                            <p:stCondLst>
+                              <p:cond delay="0"/>
+                            </p:stCondLst>
+                            <p:childTnLst>
+                              <p:par>
+                                <p:cTn id="5" presetID="1" presetClass="entr" presetSubtype="0" fill="hold" grpId="0" nodeType="clickEffect">
+                                  <p:stCondLst>
+                                    <p:cond delay="0"/>
+                                  </p:stCondLst>
+                                  <p:childTnLst>
+                                    <p:set>
+                                      <p:cBhvr>
+                                        <p:cTn id="6" dur="1" fill="hold">
+                                          <p:stCondLst>
+                                            <p:cond delay="0"/>
+                                          </p:stCondLst>
+                                        </p:cTn>
+                                        <p:tgtEl>
+                                          <p:spTgt spid="25"/>
+                                        </p:tgtEl>
+                                        <p:attrNameLst>
+                                          <p:attrName>style.visibility</p:attrName>
+                                        </p:attrNameLst>
+                                      </p:cBhvr>
+                                      <p:to>
+                                        <p:strVal val="visible"/>
+                                      </p:to>
+                                    </p:set>
+                                  </p:childTnLst>
+                                </p:cTn>
+                              </p:par>
+                              <p:par>
+                                <p:cTn id="7" presetID="1" presetClass="entr" presetSubtype="0" fill="hold" grpId="0" nodeType="withEffect">
+                                  <p:stCondLst>
+                                    <p:cond delay="0"/>
+                                  </p:stCondLst>
+                                  <p:childTnLst>
+                                    <p:set>
+                                      <p:cBhvr>
+                                        <p:cTn id="8" dur="1" fill="hold">
+                                          <p:stCondLst>
+                                            <p:cond delay="0"/>
+                                          </p:stCondLst>
+                                        </p:cTn>
+                                        <p:tgtEl>
+                                          <p:spTgt spid="28"/>
+                                        </p:tgtEl>
+                                        <p:attrNameLst>
+                                          <p:attrName>style.visibility</p:attrName>
+                                        </p:attrNameLst>
+                                      </p:cBhvr>
+                                      <p:to>
+                                        <p:strVal val="visible"/>
+                                      </p:to>
+                                    </p:set>
+                                  </p:childTnLst>
+                                </p:cTn>
+                              </p:par>
+                            </p:childTnLst>
+                          </p:cTn>
+                        </p:par>
+                      </p:childTnLst>
+                    </p:cTn>
+                  </p:par>
+                  <p:par>
+                    <p:cTn id="9" fill="hold">
+                      <p:stCondLst>
+                        <p:cond delay="indefinite"/>
+                      </p:stCondLst>
+                      <p:childTnLst>
+                        <p:par>
+                          <p:cTn id="10" fill="hold">
+                            <p:stCondLst>
+                              <p:cond delay="0"/>
+                            </p:stCondLst>
+                            <p:childTnLst>
+                              <p:par>
+                                <p:cTn id="11" presetID="25" presetClass="emph" presetSubtype="0" fill="hold" grpId="1" nodeType="clickEffect">
+                                  <p:stCondLst>
+                                    <p:cond delay="0"/>
+                                  </p:stCondLst>
+                                  <p:childTnLst>
+                                    <p:animClr clrSpc="hsl" dir="cw">
+                                      <p:cBhvr override="childStyle">
+                                        <p:cTn id="12" dur="500" fill="hold"/>
+                                        <p:tgtEl>
+                                          <p:spTgt spid="25"/>
+                                        </p:tgtEl>
+                                        <p:attrNameLst>
+                                          <p:attrName>style.color</p:attrName>
+                                        </p:attrNameLst>
+                                      </p:cBhvr>
+                                      <p:by>
+                                        <p:hsl h="0" s="-70588" l="0"/>
+                                      </p:by>
+                                    </p:animClr>
+                                    <p:animClr clrSpc="hsl" dir="cw">
+                                      <p:cBhvr>
+                                        <p:cTn id="13" dur="500" fill="hold"/>
+                                        <p:tgtEl>
+                                          <p:spTgt spid="25"/>
+                                        </p:tgtEl>
+                                        <p:attrNameLst>
+                                          <p:attrName>fillcolor</p:attrName>
+                                        </p:attrNameLst>
+                                      </p:cBhvr>
+                                      <p:by>
+                                        <p:hsl h="0" s="-70588" l="0"/>
+                                      </p:by>
+                                    </p:animClr>
+                                    <p:animClr clrSpc="hsl" dir="cw">
+                                      <p:cBhvr>
+                                        <p:cTn id="14" dur="500" fill="hold"/>
+                                        <p:tgtEl>
+                                          <p:spTgt spid="25"/>
+                                        </p:tgtEl>
+                                        <p:attrNameLst>
+                                          <p:attrName>stroke.color</p:attrName>
+                                        </p:attrNameLst>
+                                      </p:cBhvr>
+                                      <p:by>
+                                        <p:hsl h="0" s="-70588" l="0"/>
+                                      </p:by>
+                                    </p:animClr>
+                                    <p:set>
+                                      <p:cBhvr>
+                                        <p:cTn id="15" dur="500" fill="hold"/>
+                                        <p:tgtEl>
+                                          <p:spTgt spid="25"/>
+                                        </p:tgtEl>
+                                        <p:attrNameLst>
+                                          <p:attrName>fill.type</p:attrName>
+                                        </p:attrNameLst>
+                                      </p:cBhvr>
+                                      <p:to>
+                                        <p:strVal val="solid"/>
+                                      </p:to>
+                                    </p:set>
+                                  </p:childTnLst>
+                                </p:cTn>
+                              </p:par>
+                              <p:par>
+                                <p:cTn id="16" presetID="25" presetClass="emph" presetSubtype="0" fill="hold" grpId="1" nodeType="withEffect">
+                                  <p:stCondLst>
+                                    <p:cond delay="0"/>
+                                  </p:stCondLst>
+                                  <p:childTnLst>
+                                    <p:animClr clrSpc="hsl" dir="cw">
+                                      <p:cBhvr override="childStyle">
+                                        <p:cTn id="17" dur="500" fill="hold"/>
+                                        <p:tgtEl>
+                                          <p:spTgt spid="28"/>
+                                        </p:tgtEl>
+                                        <p:attrNameLst>
+                                          <p:attrName>style.color</p:attrName>
+                                        </p:attrNameLst>
+                                      </p:cBhvr>
+                                      <p:by>
+                                        <p:hsl h="0" s="-70588" l="0"/>
+                                      </p:by>
+                                    </p:animClr>
+                                    <p:animClr clrSpc="hsl" dir="cw">
+                                      <p:cBhvr>
+                                        <p:cTn id="18" dur="500" fill="hold"/>
+                                        <p:tgtEl>
+                                          <p:spTgt spid="28"/>
+                                        </p:tgtEl>
+                                        <p:attrNameLst>
+                                          <p:attrName>fillcolor</p:attrName>
+                                        </p:attrNameLst>
+                                      </p:cBhvr>
+                                      <p:by>
+                                        <p:hsl h="0" s="-70588" l="0"/>
+                                      </p:by>
+                                    </p:animClr>
+                                    <p:animClr clrSpc="hsl" dir="cw">
+                                      <p:cBhvr>
+                                        <p:cTn id="19" dur="500" fill="hold"/>
+                                        <p:tgtEl>
+                                          <p:spTgt spid="28"/>
+                                        </p:tgtEl>
+                                        <p:attrNameLst>
+                                          <p:attrName>stroke.color</p:attrName>
+                                        </p:attrNameLst>
+                                      </p:cBhvr>
+                                      <p:by>
+                                        <p:hsl h="0" s="-70588" l="0"/>
+                                      </p:by>
+                                    </p:animClr>
+                                    <p:set>
+                                      <p:cBhvr>
+                                        <p:cTn id="20" dur="500" fill="hold"/>
+                                        <p:tgtEl>
+                                          <p:spTgt spid="28"/>
+                                        </p:tgtEl>
+                                        <p:attrNameLst>
+                                          <p:attrName>fill.type</p:attrName>
+                                        </p:attrNameLst>
+                                      </p:cBhvr>
+                                      <p:to>
+                                        <p:strVal val="solid"/>
+                                      </p:to>
+                                    </p:set>
+                                  </p:childTnLst>
+                                </p:cTn>
+                              </p:par>
+                              <p:par>
+                                <p:cTn id="21" presetID="1" presetClass="entr" presetSubtype="0" fill="hold" grpId="0" nodeType="withEffect">
+                                  <p:stCondLst>
+                                    <p:cond delay="0"/>
+                                  </p:stCondLst>
+                                  <p:childTnLst>
+                                    <p:set>
+                                      <p:cBhvr>
+                                        <p:cTn id="22" dur="1" fill="hold">
+                                          <p:stCondLst>
+                                            <p:cond delay="0"/>
+                                          </p:stCondLst>
+                                        </p:cTn>
+                                        <p:tgtEl>
+                                          <p:spTgt spid="21"/>
+                                        </p:tgtEl>
+                                        <p:attrNameLst>
+                                          <p:attrName>style.visibility</p:attrName>
+                                        </p:attrNameLst>
+                                      </p:cBhvr>
+                                      <p:to>
+                                        <p:strVal val="visible"/>
+                                      </p:to>
+                                    </p:set>
+                                  </p:childTnLst>
+                                </p:cTn>
+                              </p:par>
+                              <p:par>
+                                <p:cTn id="23" presetID="1" presetClass="entr" presetSubtype="0" fill="hold" grpId="0" nodeType="withEffect">
+                                  <p:stCondLst>
+                                    <p:cond delay="0"/>
+                                  </p:stCondLst>
+                                  <p:childTnLst>
+                                    <p:set>
+                                      <p:cBhvr>
+                                        <p:cTn id="24" dur="1" fill="hold">
+                                          <p:stCondLst>
+                                            <p:cond delay="0"/>
+                                          </p:stCondLst>
+                                        </p:cTn>
+                                        <p:tgtEl>
+                                          <p:spTgt spid="23"/>
+                                        </p:tgtEl>
+                                        <p:attrNameLst>
+                                          <p:attrName>style.visibility</p:attrName>
+                                        </p:attrNameLst>
+                                      </p:cBhvr>
+                                      <p:to>
+                                        <p:strVal val="visible"/>
+                                      </p:to>
+                                    </p:set>
+                                  </p:childTnLst>
+                                </p:cTn>
+                              </p:par>
+                            </p:childTnLst>
+                          </p:cTn>
+                        </p:par>
+                      </p:childTnLst>
+                    </p:cTn>
+                  </p:par>
+                  <p:par>
+                    <p:cTn id="25" fill="hold">
+                      <p:stCondLst>
+                        <p:cond delay="indefinite"/>
+                      </p:stCondLst>
+                      <p:childTnLst>
+                        <p:par>
+                          <p:cTn id="26" fill="hold">
+                            <p:stCondLst>
+                              <p:cond delay="0"/>
+                            </p:stCondLst>
+                            <p:childTnLst>
+                              <p:par>
+                                <p:cTn id="27" presetID="1" presetClass="entr" presetSubtype="0" fill="hold" grpId="0" nodeType="clickEffect">
+                                  <p:stCondLst>
+                                    <p:cond delay="0"/>
+                                  </p:stCondLst>
+                                  <p:childTnLst>
+                                    <p:set>
+                                      <p:cBhvr>
+                                        <p:cTn id="28" dur="1" fill="hold">
+                                          <p:stCondLst>
+                                            <p:cond delay="0"/>
+                                          </p:stCondLst>
+                                        </p:cTn>
+                                        <p:tgtEl>
+                                          <p:spTgt spid="11"/>
+                                        </p:tgtEl>
+                                        <p:attrNameLst>
+                                          <p:attrName>style.visibility</p:attrName>
+                                        </p:attrNameLst>
+                                      </p:cBhvr>
+                                      <p:to>
+                                        <p:strVal val="visible"/>
+                                      </p:to>
+                                    </p:set>
+                                  </p:childTnLst>
+                                </p:cTn>
+                              </p:par>
+                              <p:par>
+                                <p:cTn id="29" presetID="1" presetClass="entr" presetSubtype="0" fill="hold" grpId="0" nodeType="withEffect">
+                                  <p:stCondLst>
+                                    <p:cond delay="0"/>
+                                  </p:stCondLst>
+                                  <p:childTnLst>
+                                    <p:set>
+                                      <p:cBhvr>
+                                        <p:cTn id="30" dur="1" fill="hold">
+                                          <p:stCondLst>
+                                            <p:cond delay="0"/>
+                                          </p:stCondLst>
+                                        </p:cTn>
+                                        <p:tgtEl>
+                                          <p:spTgt spid="12"/>
+                                        </p:tgtEl>
+                                        <p:attrNameLst>
+                                          <p:attrName>style.visibility</p:attrName>
+                                        </p:attrNameLst>
+                                      </p:cBhvr>
+                                      <p:to>
+                                        <p:strVal val="visible"/>
+                                      </p:to>
+                                    </p:set>
+                                  </p:childTnLst>
+                                </p:cTn>
+                              </p:par>
+                              <p:par>
+                                <p:cTn id="31" presetID="25" presetClass="emph" presetSubtype="0" fill="hold" grpId="1" nodeType="withEffect">
+                                  <p:stCondLst>
+                                    <p:cond delay="0"/>
+                                  </p:stCondLst>
+                                  <p:childTnLst>
+                                    <p:animClr clrSpc="hsl" dir="cw">
+                                      <p:cBhvr override="childStyle">
+                                        <p:cTn id="32" dur="500" fill="hold"/>
+                                        <p:tgtEl>
+                                          <p:spTgt spid="21"/>
+                                        </p:tgtEl>
+                                        <p:attrNameLst>
+                                          <p:attrName>style.color</p:attrName>
+                                        </p:attrNameLst>
+                                      </p:cBhvr>
+                                      <p:by>
+                                        <p:hsl h="0" s="-70588" l="0"/>
+                                      </p:by>
+                                    </p:animClr>
+                                    <p:animClr clrSpc="hsl" dir="cw">
+                                      <p:cBhvr>
+                                        <p:cTn id="33" dur="500" fill="hold"/>
+                                        <p:tgtEl>
+                                          <p:spTgt spid="21"/>
+                                        </p:tgtEl>
+                                        <p:attrNameLst>
+                                          <p:attrName>fillcolor</p:attrName>
+                                        </p:attrNameLst>
+                                      </p:cBhvr>
+                                      <p:by>
+                                        <p:hsl h="0" s="-70588" l="0"/>
+                                      </p:by>
+                                    </p:animClr>
+                                    <p:animClr clrSpc="hsl" dir="cw">
+                                      <p:cBhvr>
+                                        <p:cTn id="34" dur="500" fill="hold"/>
+                                        <p:tgtEl>
+                                          <p:spTgt spid="21"/>
+                                        </p:tgtEl>
+                                        <p:attrNameLst>
+                                          <p:attrName>stroke.color</p:attrName>
+                                        </p:attrNameLst>
+                                      </p:cBhvr>
+                                      <p:by>
+                                        <p:hsl h="0" s="-70588" l="0"/>
+                                      </p:by>
+                                    </p:animClr>
+                                    <p:set>
+                                      <p:cBhvr>
+                                        <p:cTn id="35" dur="500" fill="hold"/>
+                                        <p:tgtEl>
+                                          <p:spTgt spid="21"/>
+                                        </p:tgtEl>
+                                        <p:attrNameLst>
+                                          <p:attrName>fill.type</p:attrName>
+                                        </p:attrNameLst>
+                                      </p:cBhvr>
+                                      <p:to>
+                                        <p:strVal val="solid"/>
+                                      </p:to>
+                                    </p:set>
+                                  </p:childTnLst>
+                                </p:cTn>
+                              </p:par>
+                              <p:par>
+                                <p:cTn id="36" presetID="25" presetClass="emph" presetSubtype="0" fill="hold" grpId="1" nodeType="withEffect">
+                                  <p:stCondLst>
+                                    <p:cond delay="0"/>
+                                  </p:stCondLst>
+                                  <p:childTnLst>
+                                    <p:animClr clrSpc="hsl" dir="cw">
+                                      <p:cBhvr override="childStyle">
+                                        <p:cTn id="37" dur="500" fill="hold"/>
+                                        <p:tgtEl>
+                                          <p:spTgt spid="23"/>
+                                        </p:tgtEl>
+                                        <p:attrNameLst>
+                                          <p:attrName>style.color</p:attrName>
+                                        </p:attrNameLst>
+                                      </p:cBhvr>
+                                      <p:by>
+                                        <p:hsl h="0" s="-70588" l="0"/>
+                                      </p:by>
+                                    </p:animClr>
+                                    <p:animClr clrSpc="hsl" dir="cw">
+                                      <p:cBhvr>
+                                        <p:cTn id="38" dur="500" fill="hold"/>
+                                        <p:tgtEl>
+                                          <p:spTgt spid="23"/>
+                                        </p:tgtEl>
+                                        <p:attrNameLst>
+                                          <p:attrName>fillcolor</p:attrName>
+                                        </p:attrNameLst>
+                                      </p:cBhvr>
+                                      <p:by>
+                                        <p:hsl h="0" s="-70588" l="0"/>
+                                      </p:by>
+                                    </p:animClr>
+                                    <p:animClr clrSpc="hsl" dir="cw">
+                                      <p:cBhvr>
+                                        <p:cTn id="39" dur="500" fill="hold"/>
+                                        <p:tgtEl>
+                                          <p:spTgt spid="23"/>
+                                        </p:tgtEl>
+                                        <p:attrNameLst>
+                                          <p:attrName>stroke.color</p:attrName>
+                                        </p:attrNameLst>
+                                      </p:cBhvr>
+                                      <p:by>
+                                        <p:hsl h="0" s="-70588" l="0"/>
+                                      </p:by>
+                                    </p:animClr>
+                                    <p:set>
+                                      <p:cBhvr>
+                                        <p:cTn id="40" dur="500" fill="hold"/>
+                                        <p:tgtEl>
+                                          <p:spTgt spid="23"/>
+                                        </p:tgtEl>
+                                        <p:attrNameLst>
+                                          <p:attrName>fill.type</p:attrName>
+                                        </p:attrNameLst>
+                                      </p:cBhvr>
+                                      <p:to>
+                                        <p:strVal val="solid"/>
+                                      </p:to>
+                                    </p:set>
+                                  </p:childTnLst>
+                                </p:cTn>
+                              </p:par>
+                            </p:childTnLst>
+                          </p:cTn>
+                        </p:par>
+                      </p:childTnLst>
+                    </p:cTn>
+                  </p:par>
+                  <p:par>
+                    <p:cTn id="41" fill="hold">
+                      <p:stCondLst>
+                        <p:cond delay="indefinite"/>
+                      </p:stCondLst>
+                      <p:childTnLst>
+                        <p:par>
+                          <p:cTn id="42" fill="hold">
+                            <p:stCondLst>
+                              <p:cond delay="0"/>
+                            </p:stCondLst>
+                            <p:childTnLst>
+                              <p:par>
+                                <p:cTn id="43" presetID="25" presetClass="emph" presetSubtype="0" fill="hold" grpId="1" nodeType="clickEffect">
+                                  <p:stCondLst>
+                                    <p:cond delay="0"/>
+                                  </p:stCondLst>
+                                  <p:childTnLst>
+                                    <p:animClr clrSpc="hsl" dir="cw">
+                                      <p:cBhvr override="childStyle">
+                                        <p:cTn id="44" dur="500" fill="hold"/>
+                                        <p:tgtEl>
+                                          <p:spTgt spid="11"/>
+                                        </p:tgtEl>
+                                        <p:attrNameLst>
+                                          <p:attrName>style.color</p:attrName>
+                                        </p:attrNameLst>
+                                      </p:cBhvr>
+                                      <p:by>
+                                        <p:hsl h="0" s="-70588" l="0"/>
+                                      </p:by>
+                                    </p:animClr>
+                                    <p:animClr clrSpc="hsl" dir="cw">
+                                      <p:cBhvr>
+                                        <p:cTn id="45" dur="500" fill="hold"/>
+                                        <p:tgtEl>
+                                          <p:spTgt spid="11"/>
+                                        </p:tgtEl>
+                                        <p:attrNameLst>
+                                          <p:attrName>fillcolor</p:attrName>
+                                        </p:attrNameLst>
+                                      </p:cBhvr>
+                                      <p:by>
+                                        <p:hsl h="0" s="-70588" l="0"/>
+                                      </p:by>
+                                    </p:animClr>
+                                    <p:animClr clrSpc="hsl" dir="cw">
+                                      <p:cBhvr>
+                                        <p:cTn id="46" dur="500" fill="hold"/>
+                                        <p:tgtEl>
+                                          <p:spTgt spid="11"/>
+                                        </p:tgtEl>
+                                        <p:attrNameLst>
+                                          <p:attrName>stroke.color</p:attrName>
+                                        </p:attrNameLst>
+                                      </p:cBhvr>
+                                      <p:by>
+                                        <p:hsl h="0" s="-70588" l="0"/>
+                                      </p:by>
+                                    </p:animClr>
+                                    <p:set>
+                                      <p:cBhvr>
+                                        <p:cTn id="47" dur="500" fill="hold"/>
+                                        <p:tgtEl>
+                                          <p:spTgt spid="11"/>
+                                        </p:tgtEl>
+                                        <p:attrNameLst>
+                                          <p:attrName>fill.type</p:attrName>
+                                        </p:attrNameLst>
+                                      </p:cBhvr>
+                                      <p:to>
+                                        <p:strVal val="solid"/>
+                                      </p:to>
+                                    </p:set>
+                                  </p:childTnLst>
+                                </p:cTn>
+                              </p:par>
+                              <p:par>
+                                <p:cTn id="48" presetID="25" presetClass="emph" presetSubtype="0" fill="hold" grpId="1" nodeType="withEffect">
+                                  <p:stCondLst>
+                                    <p:cond delay="0"/>
+                                  </p:stCondLst>
+                                  <p:childTnLst>
+                                    <p:animClr clrSpc="hsl" dir="cw">
+                                      <p:cBhvr override="childStyle">
+                                        <p:cTn id="49" dur="500" fill="hold"/>
+                                        <p:tgtEl>
+                                          <p:spTgt spid="12"/>
+                                        </p:tgtEl>
+                                        <p:attrNameLst>
+                                          <p:attrName>style.color</p:attrName>
+                                        </p:attrNameLst>
+                                      </p:cBhvr>
+                                      <p:by>
+                                        <p:hsl h="0" s="-70588" l="0"/>
+                                      </p:by>
+                                    </p:animClr>
+                                    <p:animClr clrSpc="hsl" dir="cw">
+                                      <p:cBhvr>
+                                        <p:cTn id="50" dur="500" fill="hold"/>
+                                        <p:tgtEl>
+                                          <p:spTgt spid="12"/>
+                                        </p:tgtEl>
+                                        <p:attrNameLst>
+                                          <p:attrName>fillcolor</p:attrName>
+                                        </p:attrNameLst>
+                                      </p:cBhvr>
+                                      <p:by>
+                                        <p:hsl h="0" s="-70588" l="0"/>
+                                      </p:by>
+                                    </p:animClr>
+                                    <p:animClr clrSpc="hsl" dir="cw">
+                                      <p:cBhvr>
+                                        <p:cTn id="51" dur="500" fill="hold"/>
+                                        <p:tgtEl>
+                                          <p:spTgt spid="12"/>
+                                        </p:tgtEl>
+                                        <p:attrNameLst>
+                                          <p:attrName>stroke.color</p:attrName>
+                                        </p:attrNameLst>
+                                      </p:cBhvr>
+                                      <p:by>
+                                        <p:hsl h="0" s="-70588" l="0"/>
+                                      </p:by>
+                                    </p:animClr>
+                                    <p:set>
+                                      <p:cBhvr>
+                                        <p:cTn id="52" dur="500" fill="hold"/>
+                                        <p:tgtEl>
+                                          <p:spTgt spid="12"/>
+                                        </p:tgtEl>
+                                        <p:attrNameLst>
+                                          <p:attrName>fill.type</p:attrName>
+                                        </p:attrNameLst>
+                                      </p:cBhvr>
+                                      <p:to>
+                                        <p:strVal val="solid"/>
+                                      </p:to>
+                                    </p:set>
+                                  </p:childTnLst>
+                                </p:cTn>
+                              </p:par>
+                            </p:childTnLst>
+                          </p:cTn>
+                        </p:par>
+                      </p:childTnLst>
+                    </p:cTn>
+                  </p:par>
+                </p:childTnLst>
+              </p:cTn>
+              <p:prevCondLst>
+                <p:cond evt="onPrev" delay="0">
+                  <p:tgtEl>
+                    <p:sldTgt/>
+                  </p:tgtEl>
+                </p:cond>
+              </p:prevCondLst>
+              <p:nextCondLst>
+                <p:cond evt="onNext" delay="0">
+                  <p:tgtEl>
+                    <p:sldTgt/>
+                  </p:tgtEl>
+                </p:cond>
+              </p:nextCondLst>
+            </p:seq>
+          </p:childTnLst>
+        </p:cTn>
+      </p:par>
+    </p:tnLst>
+    <p:bldLst>
+      <p:bldP spid="12" grpId="0" animBg="1"/>
+      <p:bldP spid="12" grpId="1" animBg="1"/>
+      <p:bldP spid="11" grpId="0"/>
+      <p:bldP spid="11" grpId="1"/>
+      <p:bldP spid="21" grpId="0" animBg="1"/>
+      <p:bldP spid="21" grpId="1" animBg="1"/>
+      <p:bldP spid="23" grpId="0"/>
+      <p:bldP spid="23" grpId="1"/>
+      <p:bldP spid="25" grpId="0" animBg="1"/>
+      <p:bldP spid="25" grpId="1" animBg="1"/>
+      <p:bldP spid="28" grpId="0"/>
+      <p:bldP spid="28" grpId="1"/>
+    </p:bldLst>
+  </p:timing>
+</p:sld>
+</file>
+
+<file path=ppt/slides/slide6.xml><?xml version="1.0" encoding="utf-8"?>
+<p:sld xmlns:a="http://schemas.openxmlformats.org/drawingml/2006/main" xmlns:r="http://schemas.openxmlformats.org/officeDocument/2006/relationships" xmlns:p="http://schemas.openxmlformats.org/presentationml/2006/main">
+  <p:cSld>
+    <p:spTree>
+      <p:nvGrpSpPr>
+        <p:cNvPr id="1" name=""/>
+        <p:cNvGrpSpPr/>
+        <p:nvPr/>
+      </p:nvGrpSpPr>
+      <p:grpSpPr>
+        <a:xfrm>
+          <a:off x="0" y="0"/>
+          <a:ext cx="0" cy="0"/>
+          <a:chOff x="0" y="0"/>
+          <a:chExt cx="0" cy="0"/>
+        </a:xfrm>
+      </p:grpSpPr>
       <p:sp>
         <p:nvSpPr>
           <p:cNvPr id="7" name="Title 6">
@@ -13751,7 +14845,7 @@
             <a:fld id="{8C2E478F-E849-4A8C-AF1F-CBCC78A7CBFA}" type="slidenum">
               <a:rPr lang="en-US" smtClean="0"/>
               <a:pPr/>
-              <a:t>4</a:t>
+              <a:t>6</a:t>
             </a:fld>
             <a:endParaRPr lang="en-US" dirty="0"/>
           </a:p>
@@ -13770,7 +14864,7 @@
 </p:sld>
 </file>
 
-<file path=ppt/slides/slide5.xml><?xml version="1.0" encoding="utf-8"?>
+<file path=ppt/slides/slide7.xml><?xml version="1.0" encoding="utf-8"?>
 <p:sld xmlns:a="http://schemas.openxmlformats.org/drawingml/2006/main" xmlns:r="http://schemas.openxmlformats.org/officeDocument/2006/relationships" xmlns:p="http://schemas.openxmlformats.org/presentationml/2006/main">
   <p:cSld>
     <p:spTree>
@@ -14174,7 +15268,7 @@
             <a:fld id="{8C2E478F-E849-4A8C-AF1F-CBCC78A7CBFA}" type="slidenum">
               <a:rPr lang="en-US" smtClean="0"/>
               <a:pPr/>
-              <a:t>5</a:t>
+              <a:t>7</a:t>
             </a:fld>
             <a:endParaRPr lang="en-US" dirty="0"/>
           </a:p>
@@ -14193,7 +15287,7 @@
 </p:sld>
 </file>
 
-<file path=ppt/slides/slide6.xml><?xml version="1.0" encoding="utf-8"?>
+<file path=ppt/slides/slide8.xml><?xml version="1.0" encoding="utf-8"?>
 <p:sld xmlns:a="http://schemas.openxmlformats.org/drawingml/2006/main" xmlns:r="http://schemas.openxmlformats.org/officeDocument/2006/relationships" xmlns:p="http://schemas.openxmlformats.org/presentationml/2006/main">
   <p:cSld>
     <p:spTree>
@@ -14429,7 +15523,7 @@
             <a:fld id="{8C2E478F-E849-4A8C-AF1F-CBCC78A7CBFA}" type="slidenum">
               <a:rPr lang="en-US" smtClean="0"/>
               <a:pPr/>
-              <a:t>6</a:t>
+              <a:t>8</a:t>
             </a:fld>
             <a:endParaRPr lang="en-US" dirty="0"/>
           </a:p>
@@ -14476,215 +15570,7 @@
 </p:sld>
 </file>
 
-<file path=ppt/slides/slide7.xml><?xml version="1.0" encoding="utf-8"?>
-<p:sld xmlns:a="http://schemas.openxmlformats.org/drawingml/2006/main" xmlns:r="http://schemas.openxmlformats.org/officeDocument/2006/relationships" xmlns:p="http://schemas.openxmlformats.org/presentationml/2006/main">
-  <p:cSld>
-    <p:spTree>
-      <p:nvGrpSpPr>
-        <p:cNvPr id="1" name=""/>
-        <p:cNvGrpSpPr/>
-        <p:nvPr/>
-      </p:nvGrpSpPr>
-      <p:grpSpPr>
-        <a:xfrm>
-          <a:off x="0" y="0"/>
-          <a:ext cx="0" cy="0"/>
-          <a:chOff x="0" y="0"/>
-          <a:chExt cx="0" cy="0"/>
-        </a:xfrm>
-      </p:grpSpPr>
-      <p:sp>
-        <p:nvSpPr>
-          <p:cNvPr id="2" name="Title 1">
-            <a:extLst>
-              <a:ext uri="{FF2B5EF4-FFF2-40B4-BE49-F238E27FC236}">
-                <a16:creationId xmlns:a16="http://schemas.microsoft.com/office/drawing/2014/main" id="{C09ADB54-3897-4872-B9B3-1888BB60FDFF}"/>
-              </a:ext>
-            </a:extLst>
-          </p:cNvPr>
-          <p:cNvSpPr>
-            <a:spLocks noGrp="1"/>
-          </p:cNvSpPr>
-          <p:nvPr>
-            <p:ph type="title"/>
-          </p:nvPr>
-        </p:nvSpPr>
-        <p:spPr/>
-        <p:txBody>
-          <a:bodyPr/>
-          <a:lstStyle/>
-          <a:p>
-            <a:r>
-              <a:rPr lang="en-US" dirty="0"/>
-              <a:t>YOUR TITLE GOES HERE 6</a:t>
-            </a:r>
-          </a:p>
-        </p:txBody>
-      </p:sp>
-      <p:sp>
-        <p:nvSpPr>
-          <p:cNvPr id="4" name="Text Placeholder 3">
-            <a:extLst>
-              <a:ext uri="{FF2B5EF4-FFF2-40B4-BE49-F238E27FC236}">
-                <a16:creationId xmlns:a16="http://schemas.microsoft.com/office/drawing/2014/main" id="{46E2CC9E-302A-4500-B0E3-4BE84867E197}"/>
-              </a:ext>
-            </a:extLst>
-          </p:cNvPr>
-          <p:cNvSpPr>
-            <a:spLocks noGrp="1"/>
-          </p:cNvSpPr>
-          <p:nvPr>
-            <p:ph type="body" idx="13"/>
-          </p:nvPr>
-        </p:nvSpPr>
-        <p:spPr/>
-        <p:txBody>
-          <a:bodyPr/>
-          <a:lstStyle/>
-          <a:p>
-            <a:r>
-              <a:rPr lang="en-US" dirty="0"/>
-              <a:t>SUBTITLE GOES HERE</a:t>
-            </a:r>
-          </a:p>
-        </p:txBody>
-      </p:sp>
-      <p:sp>
-        <p:nvSpPr>
-          <p:cNvPr id="3" name="Content Placeholder 2">
-            <a:extLst>
-              <a:ext uri="{FF2B5EF4-FFF2-40B4-BE49-F238E27FC236}">
-                <a16:creationId xmlns:a16="http://schemas.microsoft.com/office/drawing/2014/main" id="{A999491B-46DB-4307-8E1A-E1066E4FBAEB}"/>
-              </a:ext>
-            </a:extLst>
-          </p:cNvPr>
-          <p:cNvSpPr>
-            <a:spLocks noGrp="1"/>
-          </p:cNvSpPr>
-          <p:nvPr>
-            <p:ph idx="1"/>
-          </p:nvPr>
-        </p:nvSpPr>
-        <p:spPr/>
-        <p:txBody>
-          <a:bodyPr>
-            <a:normAutofit fontScale="85000" lnSpcReduction="10000"/>
-          </a:bodyPr>
-          <a:lstStyle/>
-          <a:p>
-            <a:pPr marL="0" indent="0">
-              <a:buNone/>
-            </a:pPr>
-            <a:r>
-              <a:rPr lang="en-US" dirty="0"/>
-              <a:t>Lorem ipsum dolor sit amet, consectetur adipiscing elit. Ut gravida eros erat. Proin a tellus sed ri sus lobortis sagittis eu quis est. Duis ut aliquam nisi. Suspendisse vehicula mi diam, sit amet lacinia massa sodales ac. Fusce condimentum egestas nunc a maximus. Quisque et orci purus. Proin dolor mi, ultrices sit amet ipsum placerat, congue mattis turpis. Donec vestibulum eros eget mauris dignissim, ut ultricies dolor viverra. Phasellus efficitur ante nec sem convallis, in ornare est accumsan. Lorem ipsum dolor sit amet, consectetur adipiscing elit. Ut gravida eros erat. Proin a tellus sed risus lobortis sagittis eu quis est. </a:t>
-            </a:r>
-          </a:p>
-        </p:txBody>
-      </p:sp>
-      <p:graphicFrame>
-        <p:nvGraphicFramePr>
-          <p:cNvPr id="10" name="Chart 3" descr="Chart">
-            <a:extLst>
-              <a:ext uri="{FF2B5EF4-FFF2-40B4-BE49-F238E27FC236}">
-                <a16:creationId xmlns:a16="http://schemas.microsoft.com/office/drawing/2014/main" id="{0EB6D7F7-49BE-4D95-9DBA-99B2C7BD4949}"/>
-              </a:ext>
-            </a:extLst>
-          </p:cNvPr>
-          <p:cNvGraphicFramePr>
-            <a:graphicFrameLocks noGrp="1"/>
-          </p:cNvGraphicFramePr>
-          <p:nvPr>
-            <p:ph sz="quarter" idx="16"/>
-            <p:extLst>
-              <p:ext uri="{D42A27DB-BD31-4B8C-83A1-F6EECF244321}">
-                <p14:modId xmlns:p14="http://schemas.microsoft.com/office/powerpoint/2010/main" val="3784325792"/>
-              </p:ext>
-            </p:extLst>
-          </p:nvPr>
-        </p:nvGraphicFramePr>
-        <p:xfrm>
-          <a:off x="6400800" y="469900"/>
-          <a:ext cx="5219700" cy="5918200"/>
-        </p:xfrm>
-        <a:graphic>
-          <a:graphicData uri="http://schemas.openxmlformats.org/drawingml/2006/chart">
-            <c:chart xmlns:c="http://schemas.openxmlformats.org/drawingml/2006/chart" xmlns:r="http://schemas.openxmlformats.org/officeDocument/2006/relationships" r:id="rId2"/>
-          </a:graphicData>
-        </a:graphic>
-      </p:graphicFrame>
-      <p:sp>
-        <p:nvSpPr>
-          <p:cNvPr id="11" name="Footer Placeholder 10">
-            <a:extLst>
-              <a:ext uri="{FF2B5EF4-FFF2-40B4-BE49-F238E27FC236}">
-                <a16:creationId xmlns:a16="http://schemas.microsoft.com/office/drawing/2014/main" id="{27599ABA-671B-4E90-B4E8-5B2482234ACA}"/>
-              </a:ext>
-            </a:extLst>
-          </p:cNvPr>
-          <p:cNvSpPr>
-            <a:spLocks noGrp="1"/>
-          </p:cNvSpPr>
-          <p:nvPr>
-            <p:ph type="ftr" sz="quarter" idx="17"/>
-          </p:nvPr>
-        </p:nvSpPr>
-        <p:spPr/>
-        <p:txBody>
-          <a:bodyPr/>
-          <a:lstStyle/>
-          <a:p>
-            <a:r>
-              <a:rPr lang="en-US" dirty="0"/>
-              <a:t>Add a Footer</a:t>
-            </a:r>
-          </a:p>
-        </p:txBody>
-      </p:sp>
-      <p:sp>
-        <p:nvSpPr>
-          <p:cNvPr id="12" name="Slide Number Placeholder 11">
-            <a:extLst>
-              <a:ext uri="{FF2B5EF4-FFF2-40B4-BE49-F238E27FC236}">
-                <a16:creationId xmlns:a16="http://schemas.microsoft.com/office/drawing/2014/main" id="{A40D7403-0D24-42D0-9DE5-23601D8FBC17}"/>
-              </a:ext>
-            </a:extLst>
-          </p:cNvPr>
-          <p:cNvSpPr>
-            <a:spLocks noGrp="1"/>
-          </p:cNvSpPr>
-          <p:nvPr>
-            <p:ph type="sldNum" sz="quarter" idx="18"/>
-          </p:nvPr>
-        </p:nvSpPr>
-        <p:spPr/>
-        <p:txBody>
-          <a:bodyPr/>
-          <a:lstStyle/>
-          <a:p>
-            <a:fld id="{8C2E478F-E849-4A8C-AF1F-CBCC78A7CBFA}" type="slidenum">
-              <a:rPr lang="en-US" smtClean="0"/>
-              <a:pPr/>
-              <a:t>7</a:t>
-            </a:fld>
-            <a:endParaRPr lang="en-US" dirty="0"/>
-          </a:p>
-        </p:txBody>
-      </p:sp>
-    </p:spTree>
-    <p:extLst>
-      <p:ext uri="{BB962C8B-B14F-4D97-AF65-F5344CB8AC3E}">
-        <p14:creationId xmlns:p14="http://schemas.microsoft.com/office/powerpoint/2010/main" val="1507751133"/>
-      </p:ext>
-    </p:extLst>
-  </p:cSld>
-  <p:clrMapOvr>
-    <a:masterClrMapping/>
-  </p:clrMapOvr>
-</p:sld>
-</file>
-
-<file path=ppt/slides/slide8.xml><?xml version="1.0" encoding="utf-8"?>
+<file path=ppt/slides/slide9.xml><?xml version="1.0" encoding="utf-8"?>
 <p:sld xmlns:a="http://schemas.openxmlformats.org/drawingml/2006/main" xmlns:r="http://schemas.openxmlformats.org/officeDocument/2006/relationships" xmlns:p="http://schemas.openxmlformats.org/presentationml/2006/main">
   <p:cSld>
     <p:spTree>
@@ -16667,7 +17553,7 @@
             <a:fld id="{8C2E478F-E849-4A8C-AF1F-CBCC78A7CBFA}" type="slidenum">
               <a:rPr lang="en-US" smtClean="0"/>
               <a:pPr/>
-              <a:t>8</a:t>
+              <a:t>9</a:t>
             </a:fld>
             <a:endParaRPr lang="en-US" dirty="0"/>
           </a:p>
@@ -16677,505 +17563,6 @@
     <p:extLst>
       <p:ext uri="{BB962C8B-B14F-4D97-AF65-F5344CB8AC3E}">
         <p14:creationId xmlns:p14="http://schemas.microsoft.com/office/powerpoint/2010/main" val="2779095684"/>
-      </p:ext>
-    </p:extLst>
-  </p:cSld>
-  <p:clrMapOvr>
-    <a:masterClrMapping/>
-  </p:clrMapOvr>
-</p:sld>
-</file>
-
-<file path=ppt/slides/slide9.xml><?xml version="1.0" encoding="utf-8"?>
-<p:sld xmlns:a="http://schemas.openxmlformats.org/drawingml/2006/main" xmlns:r="http://schemas.openxmlformats.org/officeDocument/2006/relationships" xmlns:p="http://schemas.openxmlformats.org/presentationml/2006/main">
-  <p:cSld>
-    <p:spTree>
-      <p:nvGrpSpPr>
-        <p:cNvPr id="1" name=""/>
-        <p:cNvGrpSpPr/>
-        <p:nvPr/>
-      </p:nvGrpSpPr>
-      <p:grpSpPr>
-        <a:xfrm>
-          <a:off x="0" y="0"/>
-          <a:ext cx="0" cy="0"/>
-          <a:chOff x="0" y="0"/>
-          <a:chExt cx="0" cy="0"/>
-        </a:xfrm>
-      </p:grpSpPr>
-      <p:sp>
-        <p:nvSpPr>
-          <p:cNvPr id="8" name="Title 7" hidden="1">
-            <a:extLst>
-              <a:ext uri="{FF2B5EF4-FFF2-40B4-BE49-F238E27FC236}">
-                <a16:creationId xmlns:a16="http://schemas.microsoft.com/office/drawing/2014/main" id="{097D2725-75F4-45AA-950F-2F67BBF8F754}"/>
-              </a:ext>
-            </a:extLst>
-          </p:cNvPr>
-          <p:cNvSpPr>
-            <a:spLocks noGrp="1"/>
-          </p:cNvSpPr>
-          <p:nvPr>
-            <p:ph type="title"/>
-          </p:nvPr>
-        </p:nvSpPr>
-        <p:spPr>
-          <a:xfrm>
-            <a:off x="595884" y="0"/>
-            <a:ext cx="11000232" cy="1188720"/>
-          </a:xfrm>
-        </p:spPr>
-        <p:txBody>
-          <a:bodyPr/>
-          <a:lstStyle/>
-          <a:p>
-            <a:r>
-              <a:rPr lang="en-US" dirty="0"/>
-              <a:t>Title:</a:t>
-            </a:r>
-          </a:p>
-        </p:txBody>
-      </p:sp>
-      <p:pic>
-        <p:nvPicPr>
-          <p:cNvPr id="5" name="Picture Placeholder 4" descr="Abstract Building" title="Abstract Building">
-            <a:extLst>
-              <a:ext uri="{FF2B5EF4-FFF2-40B4-BE49-F238E27FC236}">
-                <a16:creationId xmlns:a16="http://schemas.microsoft.com/office/drawing/2014/main" id="{A0DC386B-E165-424D-B694-E2C45FFA4071}"/>
-              </a:ext>
-            </a:extLst>
-          </p:cNvPr>
-          <p:cNvPicPr>
-            <a:picLocks noGrp="1" noChangeAspect="1"/>
-          </p:cNvPicPr>
-          <p:nvPr>
-            <p:ph type="pic" sz="quarter" idx="10"/>
-          </p:nvPr>
-        </p:nvPicPr>
-        <p:blipFill>
-          <a:blip r:embed="rId3">
-            <a:extLst>
-              <a:ext uri="{28A0092B-C50C-407E-A947-70E740481C1C}">
-                <a14:useLocalDpi xmlns:a14="http://schemas.microsoft.com/office/drawing/2010/main" val="0"/>
-              </a:ext>
-            </a:extLst>
-          </a:blip>
-          <a:srcRect/>
-          <a:stretch>
-            <a:fillRect/>
-          </a:stretch>
-        </p:blipFill>
-        <p:spPr/>
-      </p:pic>
-      <p:sp>
-        <p:nvSpPr>
-          <p:cNvPr id="11" name="Rectangle 10">
-            <a:extLst>
-              <a:ext uri="{FF2B5EF4-FFF2-40B4-BE49-F238E27FC236}">
-                <a16:creationId xmlns:a16="http://schemas.microsoft.com/office/drawing/2014/main" id="{618826A1-4E90-405A-AE28-5500B0A362E3}"/>
-              </a:ext>
-              <a:ext uri="{C183D7F6-B498-43B3-948B-1728B52AA6E4}">
-                <adec:decorative xmlns:adec="http://schemas.microsoft.com/office/drawing/2017/decorative" val="1"/>
-              </a:ext>
-            </a:extLst>
-          </p:cNvPr>
-          <p:cNvSpPr/>
-          <p:nvPr/>
-        </p:nvSpPr>
-        <p:spPr>
-          <a:xfrm flipH="1">
-            <a:off x="6568221" y="4076700"/>
-            <a:ext cx="5386926" cy="2131595"/>
-          </a:xfrm>
-          <a:prstGeom prst="rect">
-            <a:avLst/>
-          </a:prstGeom>
-          <a:gradFill>
-            <a:gsLst>
-              <a:gs pos="0">
-                <a:srgbClr val="038B30">
-                  <a:alpha val="70000"/>
-                </a:srgbClr>
-              </a:gs>
-              <a:gs pos="100000">
-                <a:srgbClr val="C0F400">
-                  <a:alpha val="70000"/>
-                </a:srgbClr>
-              </a:gs>
-              <a:gs pos="50000">
-                <a:srgbClr val="05EE55">
-                  <a:alpha val="70000"/>
-                </a:srgbClr>
-              </a:gs>
-            </a:gsLst>
-            <a:lin ang="16200000" scaled="1"/>
-          </a:gradFill>
-          <a:ln>
-            <a:noFill/>
-          </a:ln>
-        </p:spPr>
-        <p:style>
-          <a:lnRef idx="2">
-            <a:schemeClr val="accent1">
-              <a:shade val="50000"/>
-            </a:schemeClr>
-          </a:lnRef>
-          <a:fillRef idx="1">
-            <a:schemeClr val="accent1"/>
-          </a:fillRef>
-          <a:effectRef idx="0">
-            <a:schemeClr val="accent1"/>
-          </a:effectRef>
-          <a:fontRef idx="minor">
-            <a:schemeClr val="lt1"/>
-          </a:fontRef>
-        </p:style>
-        <p:txBody>
-          <a:bodyPr rtlCol="0" anchor="ctr"/>
-          <a:lstStyle/>
-          <a:p>
-            <a:pPr algn="ctr"/>
-            <a:endParaRPr lang="en-US" dirty="0"/>
-          </a:p>
-        </p:txBody>
-      </p:sp>
-      <p:sp>
-        <p:nvSpPr>
-          <p:cNvPr id="10" name="Rectangle 9">
-            <a:extLst>
-              <a:ext uri="{FF2B5EF4-FFF2-40B4-BE49-F238E27FC236}">
-                <a16:creationId xmlns:a16="http://schemas.microsoft.com/office/drawing/2014/main" id="{0783A1B7-34FF-4F2F-A68D-A3D22C770FCB}"/>
-              </a:ext>
-              <a:ext uri="{C183D7F6-B498-43B3-948B-1728B52AA6E4}">
-                <adec:decorative xmlns:adec="http://schemas.microsoft.com/office/drawing/2017/decorative" val="1"/>
-              </a:ext>
-            </a:extLst>
-          </p:cNvPr>
-          <p:cNvSpPr/>
-          <p:nvPr/>
-        </p:nvSpPr>
-        <p:spPr>
-          <a:xfrm flipH="1">
-            <a:off x="791413" y="502215"/>
-            <a:ext cx="10638585" cy="5706080"/>
-          </a:xfrm>
-          <a:prstGeom prst="rect">
-            <a:avLst/>
-          </a:prstGeom>
-          <a:noFill/>
-          <a:ln w="88900">
-            <a:solidFill>
-              <a:schemeClr val="bg1"/>
-            </a:solidFill>
-          </a:ln>
-        </p:spPr>
-        <p:style>
-          <a:lnRef idx="2">
-            <a:schemeClr val="accent1">
-              <a:shade val="50000"/>
-            </a:schemeClr>
-          </a:lnRef>
-          <a:fillRef idx="1">
-            <a:schemeClr val="accent1"/>
-          </a:fillRef>
-          <a:effectRef idx="0">
-            <a:schemeClr val="accent1"/>
-          </a:effectRef>
-          <a:fontRef idx="minor">
-            <a:schemeClr val="lt1"/>
-          </a:fontRef>
-        </p:style>
-        <p:txBody>
-          <a:bodyPr rtlCol="0" anchor="ctr"/>
-          <a:lstStyle/>
-          <a:p>
-            <a:pPr algn="ctr"/>
-            <a:endParaRPr lang="en-US" dirty="0"/>
-          </a:p>
-        </p:txBody>
-      </p:sp>
-      <p:sp>
-        <p:nvSpPr>
-          <p:cNvPr id="14" name="Rectangle 13">
-            <a:extLst>
-              <a:ext uri="{FF2B5EF4-FFF2-40B4-BE49-F238E27FC236}">
-                <a16:creationId xmlns:a16="http://schemas.microsoft.com/office/drawing/2014/main" id="{3C1F0EB8-D260-4FB6-ACF6-6E86B9A02919}"/>
-              </a:ext>
-              <a:ext uri="{C183D7F6-B498-43B3-948B-1728B52AA6E4}">
-                <adec:decorative xmlns:adec="http://schemas.microsoft.com/office/drawing/2017/decorative" val="1"/>
-              </a:ext>
-            </a:extLst>
-          </p:cNvPr>
-          <p:cNvSpPr/>
-          <p:nvPr/>
-        </p:nvSpPr>
-        <p:spPr>
-          <a:xfrm>
-            <a:off x="6834487" y="4223911"/>
-            <a:ext cx="5357513" cy="2634089"/>
-          </a:xfrm>
-          <a:prstGeom prst="rect">
-            <a:avLst/>
-          </a:prstGeom>
-          <a:solidFill>
-            <a:srgbClr val="2F3342"/>
-          </a:solidFill>
-          <a:ln>
-            <a:noFill/>
-          </a:ln>
-          <a:effectLst/>
-        </p:spPr>
-        <p:style>
-          <a:lnRef idx="2">
-            <a:schemeClr val="accent1">
-              <a:shade val="50000"/>
-            </a:schemeClr>
-          </a:lnRef>
-          <a:fillRef idx="1">
-            <a:schemeClr val="accent1"/>
-          </a:fillRef>
-          <a:effectRef idx="0">
-            <a:schemeClr val="accent1"/>
-          </a:effectRef>
-          <a:fontRef idx="minor">
-            <a:schemeClr val="lt1"/>
-          </a:fontRef>
-        </p:style>
-        <p:txBody>
-          <a:bodyPr rtlCol="0" anchor="ctr"/>
-          <a:lstStyle/>
-          <a:p>
-            <a:pPr algn="ctr"/>
-            <a:endParaRPr lang="en-US" dirty="0"/>
-          </a:p>
-        </p:txBody>
-      </p:sp>
-      <p:sp>
-        <p:nvSpPr>
-          <p:cNvPr id="15" name="Rectangle 14">
-            <a:extLst>
-              <a:ext uri="{FF2B5EF4-FFF2-40B4-BE49-F238E27FC236}">
-                <a16:creationId xmlns:a16="http://schemas.microsoft.com/office/drawing/2014/main" id="{76D4BFC2-69CA-4ED6-89E7-A9ADB571E7A4}"/>
-              </a:ext>
-            </a:extLst>
-          </p:cNvPr>
-          <p:cNvSpPr/>
-          <p:nvPr/>
-        </p:nvSpPr>
-        <p:spPr>
-          <a:xfrm>
-            <a:off x="7050026" y="4485342"/>
-            <a:ext cx="4423315" cy="1738307"/>
-          </a:xfrm>
-          <a:prstGeom prst="rect">
-            <a:avLst/>
-          </a:prstGeom>
-          <a:noFill/>
-          <a:ln>
-            <a:noFill/>
-          </a:ln>
-        </p:spPr>
-        <p:style>
-          <a:lnRef idx="2">
-            <a:schemeClr val="accent1">
-              <a:shade val="50000"/>
-            </a:schemeClr>
-          </a:lnRef>
-          <a:fillRef idx="1">
-            <a:schemeClr val="accent1"/>
-          </a:fillRef>
-          <a:effectRef idx="0">
-            <a:schemeClr val="accent1"/>
-          </a:effectRef>
-          <a:fontRef idx="minor">
-            <a:schemeClr val="lt1"/>
-          </a:fontRef>
-        </p:style>
-        <p:txBody>
-          <a:bodyPr lIns="274320" rIns="91440" rtlCol="0" anchor="ctr"/>
-          <a:lstStyle/>
-          <a:p>
-            <a:pPr>
-              <a:lnSpc>
-                <a:spcPct val="80000"/>
-              </a:lnSpc>
-              <a:defRPr sz="10000">
-                <a:solidFill>
-                  <a:srgbClr val="3A3B39"/>
-                </a:solidFill>
-                <a:latin typeface="Bebas"/>
-                <a:ea typeface="Bebas"/>
-                <a:cs typeface="Bebas"/>
-                <a:sym typeface="Bebas"/>
-              </a:defRPr>
-            </a:pPr>
-            <a:r>
-              <a:rPr lang="en-US" sz="3200" b="1" dirty="0">
-                <a:solidFill>
-                  <a:schemeClr val="bg1"/>
-                </a:solidFill>
-                <a:latin typeface="+mj-lt"/>
-                <a:cs typeface="Gill Sans" panose="020B0502020104020203" pitchFamily="34" charset="-79"/>
-              </a:rPr>
-              <a:t>YOUR TITLE GOES HERE</a:t>
-            </a:r>
-          </a:p>
-          <a:p>
-            <a:r>
-              <a:rPr lang="en-US" sz="1200" dirty="0">
-                <a:latin typeface="+mj-lt"/>
-              </a:rPr>
-              <a:t>Lorem ipsum dolor sit amet, consectetur adipiscing elit. </a:t>
-            </a:r>
-            <a:br>
-              <a:rPr lang="en-US" sz="1200" dirty="0">
-                <a:latin typeface="+mj-lt"/>
-              </a:rPr>
-            </a:br>
-            <a:r>
-              <a:rPr lang="en-US" sz="1200" dirty="0">
-                <a:latin typeface="+mj-lt"/>
-              </a:rPr>
-              <a:t>Ut gravida eros erat. Proin a tellus sed risus lobortis sagitti</a:t>
-            </a:r>
-          </a:p>
-        </p:txBody>
-      </p:sp>
-      <p:sp>
-        <p:nvSpPr>
-          <p:cNvPr id="2" name="Footer Placeholder 1">
-            <a:extLst>
-              <a:ext uri="{FF2B5EF4-FFF2-40B4-BE49-F238E27FC236}">
-                <a16:creationId xmlns:a16="http://schemas.microsoft.com/office/drawing/2014/main" id="{3D8BBA11-131E-446B-BC9B-D0A09B1AF059}"/>
-              </a:ext>
-            </a:extLst>
-          </p:cNvPr>
-          <p:cNvSpPr>
-            <a:spLocks noGrp="1"/>
-          </p:cNvSpPr>
-          <p:nvPr>
-            <p:ph type="ftr" sz="quarter" idx="11"/>
-          </p:nvPr>
-        </p:nvSpPr>
-        <p:spPr/>
-        <p:txBody>
-          <a:bodyPr/>
-          <a:lstStyle/>
-          <a:p>
-            <a:r>
-              <a:rPr lang="en-US" dirty="0"/>
-              <a:t>Add a Footer</a:t>
-            </a:r>
-          </a:p>
-        </p:txBody>
-      </p:sp>
-      <p:sp>
-        <p:nvSpPr>
-          <p:cNvPr id="9" name="Rectangle: Single Corner Snipped 8" descr="Footer accent box">
-            <a:extLst>
-              <a:ext uri="{FF2B5EF4-FFF2-40B4-BE49-F238E27FC236}">
-                <a16:creationId xmlns:a16="http://schemas.microsoft.com/office/drawing/2014/main" id="{DF712259-BEF9-4B45-8D68-5F74C49207DE}"/>
-              </a:ext>
-            </a:extLst>
-          </p:cNvPr>
-          <p:cNvSpPr/>
-          <p:nvPr/>
-        </p:nvSpPr>
-        <p:spPr>
-          <a:xfrm flipH="1">
-            <a:off x="11549269" y="6356350"/>
-            <a:ext cx="642731" cy="501650"/>
-          </a:xfrm>
-          <a:prstGeom prst="snip1Rect">
-            <a:avLst/>
-          </a:prstGeom>
-          <a:gradFill>
-            <a:gsLst>
-              <a:gs pos="0">
-                <a:srgbClr val="038B30">
-                  <a:alpha val="70000"/>
-                </a:srgbClr>
-              </a:gs>
-              <a:gs pos="50000">
-                <a:srgbClr val="05EE55">
-                  <a:alpha val="70000"/>
-                </a:srgbClr>
-              </a:gs>
-              <a:gs pos="100000">
-                <a:srgbClr val="C0F400">
-                  <a:alpha val="70000"/>
-                </a:srgbClr>
-              </a:gs>
-            </a:gsLst>
-            <a:lin ang="5400000" scaled="1"/>
-          </a:gradFill>
-          <a:ln>
-            <a:noFill/>
-          </a:ln>
-        </p:spPr>
-        <p:style>
-          <a:lnRef idx="2">
-            <a:schemeClr val="accent1">
-              <a:shade val="50000"/>
-            </a:schemeClr>
-          </a:lnRef>
-          <a:fillRef idx="1">
-            <a:schemeClr val="accent1"/>
-          </a:fillRef>
-          <a:effectRef idx="0">
-            <a:schemeClr val="accent1"/>
-          </a:effectRef>
-          <a:fontRef idx="minor">
-            <a:schemeClr val="lt1"/>
-          </a:fontRef>
-        </p:style>
-        <p:txBody>
-          <a:bodyPr rtlCol="0" anchor="ctr"/>
-          <a:lstStyle/>
-          <a:p>
-            <a:pPr algn="ctr"/>
-            <a:endParaRPr lang="en-US" dirty="0">
-              <a:solidFill>
-                <a:schemeClr val="bg1"/>
-              </a:solidFill>
-            </a:endParaRPr>
-          </a:p>
-        </p:txBody>
-      </p:sp>
-      <p:sp>
-        <p:nvSpPr>
-          <p:cNvPr id="3" name="Slide Number Placeholder 2">
-            <a:extLst>
-              <a:ext uri="{FF2B5EF4-FFF2-40B4-BE49-F238E27FC236}">
-                <a16:creationId xmlns:a16="http://schemas.microsoft.com/office/drawing/2014/main" id="{206B3DE3-5308-4ADE-BC26-29765480D1E1}"/>
-              </a:ext>
-            </a:extLst>
-          </p:cNvPr>
-          <p:cNvSpPr>
-            <a:spLocks noGrp="1"/>
-          </p:cNvSpPr>
-          <p:nvPr>
-            <p:ph type="sldNum" sz="quarter" idx="12"/>
-          </p:nvPr>
-        </p:nvSpPr>
-        <p:spPr/>
-        <p:txBody>
-          <a:bodyPr/>
-          <a:lstStyle/>
-          <a:p>
-            <a:fld id="{8C2E478F-E849-4A8C-AF1F-CBCC78A7CBFA}" type="slidenum">
-              <a:rPr lang="en-US" smtClean="0"/>
-              <a:pPr/>
-              <a:t>9</a:t>
-            </a:fld>
-            <a:endParaRPr lang="en-US" dirty="0"/>
-          </a:p>
-        </p:txBody>
-      </p:sp>
-    </p:spTree>
-    <p:extLst>
-      <p:ext uri="{BB962C8B-B14F-4D97-AF65-F5344CB8AC3E}">
-        <p14:creationId xmlns:p14="http://schemas.microsoft.com/office/powerpoint/2010/main" val="1389222877"/>
       </p:ext>
     </p:extLst>
   </p:cSld>
@@ -17986,6 +18373,15 @@
 </file>
 
 <file path=customXml/item2.xml><?xml version="1.0" encoding="utf-8"?>
+<p:properties xmlns:p="http://schemas.microsoft.com/office/2006/metadata/properties" xmlns:xsi="http://www.w3.org/2001/XMLSchema-instance" xmlns:pc="http://schemas.microsoft.com/office/infopath/2007/PartnerControls">
+  <documentManagement>
+    <Status xmlns="71af3243-3dd4-4a8d-8c0d-dd76da1f02a5">Not started</Status>
+    <MediaServiceKeyPoints xmlns="71af3243-3dd4-4a8d-8c0d-dd76da1f02a5" xsi:nil="true"/>
+  </documentManagement>
+</p:properties>
+</file>
+
+<file path=customXml/item3.xml><?xml version="1.0" encoding="utf-8"?>
 <ct:contentTypeSchema xmlns:ct="http://schemas.microsoft.com/office/2006/metadata/contentType" xmlns:ma="http://schemas.microsoft.com/office/2006/metadata/properties/metaAttributes" ct:_="" ma:_="" ma:contentTypeName="Document" ma:contentTypeID="0x01010079F111ED35F8CC479449609E8A0923A6" ma:contentTypeVersion="12" ma:contentTypeDescription="Create a new document." ma:contentTypeScope="" ma:versionID="7f9b5e87859ce6d7eedbdc6e4e4205ca">
   <xsd:schema xmlns:xsd="http://www.w3.org/2001/XMLSchema" xmlns:xs="http://www.w3.org/2001/XMLSchema" xmlns:p="http://schemas.microsoft.com/office/2006/metadata/properties" xmlns:ns2="71af3243-3dd4-4a8d-8c0d-dd76da1f02a5" xmlns:ns3="16c05727-aa75-4e4a-9b5f-8a80a1165891" targetNamespace="http://schemas.microsoft.com/office/2006/metadata/properties" ma:root="true" ma:fieldsID="a5e0075ee7624d6a846e01eb61837427" ns2:_="" ns3:_="">
     <xsd:import namespace="71af3243-3dd4-4a8d-8c0d-dd76da1f02a5"/>
@@ -18206,15 +18602,6 @@
 </ct:contentTypeSchema>
 </file>
 
-<file path=customXml/item3.xml><?xml version="1.0" encoding="utf-8"?>
-<p:properties xmlns:p="http://schemas.microsoft.com/office/2006/metadata/properties" xmlns:xsi="http://www.w3.org/2001/XMLSchema-instance" xmlns:pc="http://schemas.microsoft.com/office/infopath/2007/PartnerControls">
-  <documentManagement>
-    <Status xmlns="71af3243-3dd4-4a8d-8c0d-dd76da1f02a5">Not started</Status>
-    <MediaServiceKeyPoints xmlns="71af3243-3dd4-4a8d-8c0d-dd76da1f02a5" xsi:nil="true"/>
-  </documentManagement>
-</p:properties>
-</file>
-
 <file path=customXml/itemProps1.xml><?xml version="1.0" encoding="utf-8"?>
 <ds:datastoreItem xmlns:ds="http://schemas.openxmlformats.org/officeDocument/2006/customXml" ds:itemID="{26A0F1FB-B1B3-48EC-BFEE-FC0094A34C28}">
   <ds:schemaRefs>
@@ -18224,6 +18611,16 @@
 </file>
 
 <file path=customXml/itemProps2.xml><?xml version="1.0" encoding="utf-8"?>
+<ds:datastoreItem xmlns:ds="http://schemas.openxmlformats.org/officeDocument/2006/customXml" ds:itemID="{471340EA-4D3D-470F-B5D6-C0F623079401}">
+  <ds:schemaRefs>
+    <ds:schemaRef ds:uri="http://schemas.microsoft.com/office/2006/metadata/properties"/>
+    <ds:schemaRef ds:uri="http://schemas.microsoft.com/office/infopath/2007/PartnerControls"/>
+    <ds:schemaRef ds:uri="71af3243-3dd4-4a8d-8c0d-dd76da1f02a5"/>
+  </ds:schemaRefs>
+</ds:datastoreItem>
+</file>
+
+<file path=customXml/itemProps3.xml><?xml version="1.0" encoding="utf-8"?>
 <ds:datastoreItem xmlns:ds="http://schemas.openxmlformats.org/officeDocument/2006/customXml" ds:itemID="{1B834546-CF5A-40F0-B105-33C88EC0593D}">
   <ds:schemaRefs>
     <ds:schemaRef ds:uri="http://schemas.microsoft.com/office/2006/metadata/contentType"/>
@@ -18240,14 +18637,4 @@
     <ds:schemaRef ds:uri="http://schemas.microsoft.com/internal/obd"/>
   </ds:schemaRefs>
 </ds:datastoreItem>
-</file>
-
-<file path=customXml/itemProps3.xml><?xml version="1.0" encoding="utf-8"?>
-<ds:datastoreItem xmlns:ds="http://schemas.openxmlformats.org/officeDocument/2006/customXml" ds:itemID="{471340EA-4D3D-470F-B5D6-C0F623079401}">
-  <ds:schemaRefs>
-    <ds:schemaRef ds:uri="http://schemas.microsoft.com/office/2006/metadata/properties"/>
-    <ds:schemaRef ds:uri="http://schemas.microsoft.com/office/infopath/2007/PartnerControls"/>
-    <ds:schemaRef ds:uri="71af3243-3dd4-4a8d-8c0d-dd76da1f02a5"/>
-  </ds:schemaRefs>
-</ds:datastoreItem>
 </file>
</xml_diff>